<commit_message>
added more to pres
</commit_message>
<xml_diff>
--- a/defence_pres.pptx
+++ b/defence_pres.pptx
@@ -5,15 +5,24 @@
     <p:sldMasterId id="2147483648" r:id="rId1"/>
   </p:sldMasterIdLst>
   <p:notesMasterIdLst>
-    <p:notesMasterId r:id="rId8"/>
+    <p:notesMasterId r:id="rId17"/>
   </p:notesMasterIdLst>
   <p:sldIdLst>
     <p:sldId id="256" r:id="rId2"/>
-    <p:sldId id="257" r:id="rId3"/>
-    <p:sldId id="258" r:id="rId4"/>
-    <p:sldId id="259" r:id="rId5"/>
-    <p:sldId id="260" r:id="rId6"/>
-    <p:sldId id="261" r:id="rId7"/>
+    <p:sldId id="267" r:id="rId3"/>
+    <p:sldId id="263" r:id="rId4"/>
+    <p:sldId id="257" r:id="rId5"/>
+    <p:sldId id="258" r:id="rId6"/>
+    <p:sldId id="259" r:id="rId7"/>
+    <p:sldId id="260" r:id="rId8"/>
+    <p:sldId id="261" r:id="rId9"/>
+    <p:sldId id="262" r:id="rId10"/>
+    <p:sldId id="268" r:id="rId11"/>
+    <p:sldId id="269" r:id="rId12"/>
+    <p:sldId id="270" r:id="rId13"/>
+    <p:sldId id="271" r:id="rId14"/>
+    <p:sldId id="272" r:id="rId15"/>
+    <p:sldId id="273" r:id="rId16"/>
   </p:sldIdLst>
   <p:sldSz cx="12192000" cy="6858000"/>
   <p:notesSz cx="6858000" cy="9144000"/>
@@ -112,6 +121,11 @@
       </a:defRPr>
     </a:lvl9pPr>
   </p:defaultTextStyle>
+  <p:extLst>
+    <p:ext uri="{EFAFB233-063F-42B5-8137-9DF3F51BA10A}">
+      <p15:sldGuideLst xmlns:p15="http://schemas.microsoft.com/office/powerpoint/2012/main"/>
+    </p:ext>
+  </p:extLst>
 </p:presentation>
 </file>
 
@@ -197,7 +211,7 @@
           <a:p>
             <a:fld id="{E8F6BDA0-F868-4041-A6EE-DDCB528AC0BD}" type="datetimeFigureOut">
               <a:rPr lang="en-US" smtClean="0"/>
-              <a:t>8/3/18</a:t>
+              <a:t>8/14/18</a:t>
             </a:fld>
             <a:endParaRPr lang="en-US"/>
           </a:p>
@@ -261,38 +275,37 @@
           <a:p>
             <a:pPr lvl="0"/>
             <a:r>
-              <a:rPr lang="en-US" smtClean="0"/>
+              <a:rPr lang="en-US"/>
               <a:t>Click to edit Master text styles</a:t>
             </a:r>
           </a:p>
           <a:p>
             <a:pPr lvl="1"/>
             <a:r>
-              <a:rPr lang="en-US" smtClean="0"/>
+              <a:rPr lang="en-US"/>
               <a:t>Second level</a:t>
             </a:r>
           </a:p>
           <a:p>
             <a:pPr lvl="2"/>
             <a:r>
-              <a:rPr lang="en-US" smtClean="0"/>
+              <a:rPr lang="en-US"/>
               <a:t>Third level</a:t>
             </a:r>
           </a:p>
           <a:p>
             <a:pPr lvl="3"/>
             <a:r>
-              <a:rPr lang="en-US" smtClean="0"/>
+              <a:rPr lang="en-US"/>
               <a:t>Fourth level</a:t>
             </a:r>
           </a:p>
           <a:p>
             <a:pPr lvl="4"/>
             <a:r>
-              <a:rPr lang="en-US" smtClean="0"/>
+              <a:rPr lang="en-US"/>
               <a:t>Fifth level</a:t>
             </a:r>
-            <a:endParaRPr lang="en-US"/>
           </a:p>
         </p:txBody>
       </p:sp>
@@ -591,10 +604,9 @@
           </a:lstStyle>
           <a:p>
             <a:r>
-              <a:rPr lang="en-US" smtClean="0"/>
+              <a:rPr lang="en-US"/>
               <a:t>Click to edit Master title style</a:t>
             </a:r>
-            <a:endParaRPr lang="en-US"/>
           </a:p>
         </p:txBody>
       </p:sp>
@@ -656,10 +668,9 @@
           </a:lstStyle>
           <a:p>
             <a:r>
-              <a:rPr lang="en-US" smtClean="0"/>
+              <a:rPr lang="en-US"/>
               <a:t>Click to edit Master subtitle style</a:t>
             </a:r>
-            <a:endParaRPr lang="en-US"/>
           </a:p>
         </p:txBody>
       </p:sp>
@@ -680,7 +691,7 @@
           <a:p>
             <a:fld id="{65B647E7-F2FD-C046-AE4E-822F44CBDCFE}" type="datetime1">
               <a:rPr lang="en-US" smtClean="0"/>
-              <a:t>8/3/18</a:t>
+              <a:t>8/14/18</a:t>
             </a:fld>
             <a:endParaRPr lang="en-US"/>
           </a:p>
@@ -774,10 +785,9 @@
           <a:lstStyle/>
           <a:p>
             <a:r>
-              <a:rPr lang="en-US" smtClean="0"/>
+              <a:rPr lang="en-US"/>
               <a:t>Click to edit Master title style</a:t>
             </a:r>
-            <a:endParaRPr lang="en-US"/>
           </a:p>
         </p:txBody>
       </p:sp>
@@ -798,38 +808,37 @@
           <a:p>
             <a:pPr lvl="0"/>
             <a:r>
-              <a:rPr lang="en-US" smtClean="0"/>
+              <a:rPr lang="en-US"/>
               <a:t>Click to edit Master text styles</a:t>
             </a:r>
           </a:p>
           <a:p>
             <a:pPr lvl="1"/>
             <a:r>
-              <a:rPr lang="en-US" smtClean="0"/>
+              <a:rPr lang="en-US"/>
               <a:t>Second level</a:t>
             </a:r>
           </a:p>
           <a:p>
             <a:pPr lvl="2"/>
             <a:r>
-              <a:rPr lang="en-US" smtClean="0"/>
+              <a:rPr lang="en-US"/>
               <a:t>Third level</a:t>
             </a:r>
           </a:p>
           <a:p>
             <a:pPr lvl="3"/>
             <a:r>
-              <a:rPr lang="en-US" smtClean="0"/>
+              <a:rPr lang="en-US"/>
               <a:t>Fourth level</a:t>
             </a:r>
           </a:p>
           <a:p>
             <a:pPr lvl="4"/>
             <a:r>
-              <a:rPr lang="en-US" smtClean="0"/>
+              <a:rPr lang="en-US"/>
               <a:t>Fifth level</a:t>
             </a:r>
-            <a:endParaRPr lang="en-US"/>
           </a:p>
         </p:txBody>
       </p:sp>
@@ -850,7 +859,7 @@
           <a:p>
             <a:fld id="{9424FA29-0846-1A4F-8B42-44FD48A72841}" type="datetime1">
               <a:rPr lang="en-US" smtClean="0"/>
-              <a:t>8/3/18</a:t>
+              <a:t>8/14/18</a:t>
             </a:fld>
             <a:endParaRPr lang="en-US"/>
           </a:p>
@@ -949,10 +958,9 @@
           <a:lstStyle/>
           <a:p>
             <a:r>
-              <a:rPr lang="en-US" smtClean="0"/>
+              <a:rPr lang="en-US"/>
               <a:t>Click to edit Master title style</a:t>
             </a:r>
-            <a:endParaRPr lang="en-US"/>
           </a:p>
         </p:txBody>
       </p:sp>
@@ -978,38 +986,37 @@
           <a:p>
             <a:pPr lvl="0"/>
             <a:r>
-              <a:rPr lang="en-US" smtClean="0"/>
+              <a:rPr lang="en-US"/>
               <a:t>Click to edit Master text styles</a:t>
             </a:r>
           </a:p>
           <a:p>
             <a:pPr lvl="1"/>
             <a:r>
-              <a:rPr lang="en-US" smtClean="0"/>
+              <a:rPr lang="en-US"/>
               <a:t>Second level</a:t>
             </a:r>
           </a:p>
           <a:p>
             <a:pPr lvl="2"/>
             <a:r>
-              <a:rPr lang="en-US" smtClean="0"/>
+              <a:rPr lang="en-US"/>
               <a:t>Third level</a:t>
             </a:r>
           </a:p>
           <a:p>
             <a:pPr lvl="3"/>
             <a:r>
-              <a:rPr lang="en-US" smtClean="0"/>
+              <a:rPr lang="en-US"/>
               <a:t>Fourth level</a:t>
             </a:r>
           </a:p>
           <a:p>
             <a:pPr lvl="4"/>
             <a:r>
-              <a:rPr lang="en-US" smtClean="0"/>
+              <a:rPr lang="en-US"/>
               <a:t>Fifth level</a:t>
             </a:r>
-            <a:endParaRPr lang="en-US"/>
           </a:p>
         </p:txBody>
       </p:sp>
@@ -1030,7 +1037,7 @@
           <a:p>
             <a:fld id="{84F6E449-A0D1-3643-A7D7-A59097C7D579}" type="datetime1">
               <a:rPr lang="en-US" smtClean="0"/>
-              <a:t>8/3/18</a:t>
+              <a:t>8/14/18</a:t>
             </a:fld>
             <a:endParaRPr lang="en-US"/>
           </a:p>
@@ -1124,10 +1131,9 @@
           <a:lstStyle/>
           <a:p>
             <a:r>
-              <a:rPr lang="en-US" smtClean="0"/>
+              <a:rPr lang="en-US"/>
               <a:t>Click to edit Master title style</a:t>
             </a:r>
-            <a:endParaRPr lang="en-US"/>
           </a:p>
         </p:txBody>
       </p:sp>
@@ -1148,38 +1154,37 @@
           <a:p>
             <a:pPr lvl="0"/>
             <a:r>
-              <a:rPr lang="en-US" smtClean="0"/>
+              <a:rPr lang="en-US"/>
               <a:t>Click to edit Master text styles</a:t>
             </a:r>
           </a:p>
           <a:p>
             <a:pPr lvl="1"/>
             <a:r>
-              <a:rPr lang="en-US" smtClean="0"/>
+              <a:rPr lang="en-US"/>
               <a:t>Second level</a:t>
             </a:r>
           </a:p>
           <a:p>
             <a:pPr lvl="2"/>
             <a:r>
-              <a:rPr lang="en-US" smtClean="0"/>
+              <a:rPr lang="en-US"/>
               <a:t>Third level</a:t>
             </a:r>
           </a:p>
           <a:p>
             <a:pPr lvl="3"/>
             <a:r>
-              <a:rPr lang="en-US" smtClean="0"/>
+              <a:rPr lang="en-US"/>
               <a:t>Fourth level</a:t>
             </a:r>
           </a:p>
           <a:p>
             <a:pPr lvl="4"/>
             <a:r>
-              <a:rPr lang="en-US" smtClean="0"/>
+              <a:rPr lang="en-US"/>
               <a:t>Fifth level</a:t>
             </a:r>
-            <a:endParaRPr lang="en-US"/>
           </a:p>
         </p:txBody>
       </p:sp>
@@ -1200,7 +1205,7 @@
           <a:p>
             <a:fld id="{9749DFA2-4482-F346-BF65-01AB6F68467C}" type="datetime1">
               <a:rPr lang="en-US" smtClean="0"/>
-              <a:t>8/3/18</a:t>
+              <a:t>8/14/18</a:t>
             </a:fld>
             <a:endParaRPr lang="en-US"/>
           </a:p>
@@ -1303,10 +1308,9 @@
           </a:lstStyle>
           <a:p>
             <a:r>
-              <a:rPr lang="en-US" smtClean="0"/>
+              <a:rPr lang="en-US"/>
               <a:t>Click to edit Master title style</a:t>
             </a:r>
-            <a:endParaRPr lang="en-US"/>
           </a:p>
         </p:txBody>
       </p:sp>
@@ -1423,7 +1427,7 @@
           <a:p>
             <a:pPr lvl="0"/>
             <a:r>
-              <a:rPr lang="en-US" smtClean="0"/>
+              <a:rPr lang="en-US"/>
               <a:t>Click to edit Master text styles</a:t>
             </a:r>
           </a:p>
@@ -1446,7 +1450,7 @@
           <a:p>
             <a:fld id="{2BA1D4F4-FBFF-6B47-948C-F00C91736A58}" type="datetime1">
               <a:rPr lang="en-US" smtClean="0"/>
-              <a:t>8/3/18</a:t>
+              <a:t>8/14/18</a:t>
             </a:fld>
             <a:endParaRPr lang="en-US"/>
           </a:p>
@@ -1540,10 +1544,9 @@
           <a:lstStyle/>
           <a:p>
             <a:r>
-              <a:rPr lang="en-US" smtClean="0"/>
+              <a:rPr lang="en-US"/>
               <a:t>Click to edit Master title style</a:t>
             </a:r>
-            <a:endParaRPr lang="en-US"/>
           </a:p>
         </p:txBody>
       </p:sp>
@@ -1569,38 +1572,37 @@
           <a:p>
             <a:pPr lvl="0"/>
             <a:r>
-              <a:rPr lang="en-US" smtClean="0"/>
+              <a:rPr lang="en-US"/>
               <a:t>Click to edit Master text styles</a:t>
             </a:r>
           </a:p>
           <a:p>
             <a:pPr lvl="1"/>
             <a:r>
-              <a:rPr lang="en-US" smtClean="0"/>
+              <a:rPr lang="en-US"/>
               <a:t>Second level</a:t>
             </a:r>
           </a:p>
           <a:p>
             <a:pPr lvl="2"/>
             <a:r>
-              <a:rPr lang="en-US" smtClean="0"/>
+              <a:rPr lang="en-US"/>
               <a:t>Third level</a:t>
             </a:r>
           </a:p>
           <a:p>
             <a:pPr lvl="3"/>
             <a:r>
-              <a:rPr lang="en-US" smtClean="0"/>
+              <a:rPr lang="en-US"/>
               <a:t>Fourth level</a:t>
             </a:r>
           </a:p>
           <a:p>
             <a:pPr lvl="4"/>
             <a:r>
-              <a:rPr lang="en-US" smtClean="0"/>
+              <a:rPr lang="en-US"/>
               <a:t>Fifth level</a:t>
             </a:r>
-            <a:endParaRPr lang="en-US"/>
           </a:p>
         </p:txBody>
       </p:sp>
@@ -1626,38 +1628,37 @@
           <a:p>
             <a:pPr lvl="0"/>
             <a:r>
-              <a:rPr lang="en-US" smtClean="0"/>
+              <a:rPr lang="en-US"/>
               <a:t>Click to edit Master text styles</a:t>
             </a:r>
           </a:p>
           <a:p>
             <a:pPr lvl="1"/>
             <a:r>
-              <a:rPr lang="en-US" smtClean="0"/>
+              <a:rPr lang="en-US"/>
               <a:t>Second level</a:t>
             </a:r>
           </a:p>
           <a:p>
             <a:pPr lvl="2"/>
             <a:r>
-              <a:rPr lang="en-US" smtClean="0"/>
+              <a:rPr lang="en-US"/>
               <a:t>Third level</a:t>
             </a:r>
           </a:p>
           <a:p>
             <a:pPr lvl="3"/>
             <a:r>
-              <a:rPr lang="en-US" smtClean="0"/>
+              <a:rPr lang="en-US"/>
               <a:t>Fourth level</a:t>
             </a:r>
           </a:p>
           <a:p>
             <a:pPr lvl="4"/>
             <a:r>
-              <a:rPr lang="en-US" smtClean="0"/>
+              <a:rPr lang="en-US"/>
               <a:t>Fifth level</a:t>
             </a:r>
-            <a:endParaRPr lang="en-US"/>
           </a:p>
         </p:txBody>
       </p:sp>
@@ -1678,7 +1679,7 @@
           <a:p>
             <a:fld id="{F21DCF1E-4E69-644E-BC35-F57D9A513B6D}" type="datetime1">
               <a:rPr lang="en-US" smtClean="0"/>
-              <a:t>8/3/18</a:t>
+              <a:t>8/14/18</a:t>
             </a:fld>
             <a:endParaRPr lang="en-US"/>
           </a:p>
@@ -1777,10 +1778,9 @@
           <a:lstStyle/>
           <a:p>
             <a:r>
-              <a:rPr lang="en-US" smtClean="0"/>
+              <a:rPr lang="en-US"/>
               <a:t>Click to edit Master title style</a:t>
             </a:r>
-            <a:endParaRPr lang="en-US"/>
           </a:p>
         </p:txBody>
       </p:sp>
@@ -1843,7 +1843,7 @@
           <a:p>
             <a:pPr lvl="0"/>
             <a:r>
-              <a:rPr lang="en-US" smtClean="0"/>
+              <a:rPr lang="en-US"/>
               <a:t>Click to edit Master text styles</a:t>
             </a:r>
           </a:p>
@@ -1871,38 +1871,37 @@
           <a:p>
             <a:pPr lvl="0"/>
             <a:r>
-              <a:rPr lang="en-US" smtClean="0"/>
+              <a:rPr lang="en-US"/>
               <a:t>Click to edit Master text styles</a:t>
             </a:r>
           </a:p>
           <a:p>
             <a:pPr lvl="1"/>
             <a:r>
-              <a:rPr lang="en-US" smtClean="0"/>
+              <a:rPr lang="en-US"/>
               <a:t>Second level</a:t>
             </a:r>
           </a:p>
           <a:p>
             <a:pPr lvl="2"/>
             <a:r>
-              <a:rPr lang="en-US" smtClean="0"/>
+              <a:rPr lang="en-US"/>
               <a:t>Third level</a:t>
             </a:r>
           </a:p>
           <a:p>
             <a:pPr lvl="3"/>
             <a:r>
-              <a:rPr lang="en-US" smtClean="0"/>
+              <a:rPr lang="en-US"/>
               <a:t>Fourth level</a:t>
             </a:r>
           </a:p>
           <a:p>
             <a:pPr lvl="4"/>
             <a:r>
-              <a:rPr lang="en-US" smtClean="0"/>
+              <a:rPr lang="en-US"/>
               <a:t>Fifth level</a:t>
             </a:r>
-            <a:endParaRPr lang="en-US"/>
           </a:p>
         </p:txBody>
       </p:sp>
@@ -1965,7 +1964,7 @@
           <a:p>
             <a:pPr lvl="0"/>
             <a:r>
-              <a:rPr lang="en-US" smtClean="0"/>
+              <a:rPr lang="en-US"/>
               <a:t>Click to edit Master text styles</a:t>
             </a:r>
           </a:p>
@@ -1993,38 +1992,37 @@
           <a:p>
             <a:pPr lvl="0"/>
             <a:r>
-              <a:rPr lang="en-US" smtClean="0"/>
+              <a:rPr lang="en-US"/>
               <a:t>Click to edit Master text styles</a:t>
             </a:r>
           </a:p>
           <a:p>
             <a:pPr lvl="1"/>
             <a:r>
-              <a:rPr lang="en-US" smtClean="0"/>
+              <a:rPr lang="en-US"/>
               <a:t>Second level</a:t>
             </a:r>
           </a:p>
           <a:p>
             <a:pPr lvl="2"/>
             <a:r>
-              <a:rPr lang="en-US" smtClean="0"/>
+              <a:rPr lang="en-US"/>
               <a:t>Third level</a:t>
             </a:r>
           </a:p>
           <a:p>
             <a:pPr lvl="3"/>
             <a:r>
-              <a:rPr lang="en-US" smtClean="0"/>
+              <a:rPr lang="en-US"/>
               <a:t>Fourth level</a:t>
             </a:r>
           </a:p>
           <a:p>
             <a:pPr lvl="4"/>
             <a:r>
-              <a:rPr lang="en-US" smtClean="0"/>
+              <a:rPr lang="en-US"/>
               <a:t>Fifth level</a:t>
             </a:r>
-            <a:endParaRPr lang="en-US"/>
           </a:p>
         </p:txBody>
       </p:sp>
@@ -2045,7 +2043,7 @@
           <a:p>
             <a:fld id="{9D7FE025-2747-7447-8FB5-4A48E529A1CB}" type="datetime1">
               <a:rPr lang="en-US" smtClean="0"/>
-              <a:t>8/3/18</a:t>
+              <a:t>8/14/18</a:t>
             </a:fld>
             <a:endParaRPr lang="en-US"/>
           </a:p>
@@ -2139,10 +2137,9 @@
           <a:lstStyle/>
           <a:p>
             <a:r>
-              <a:rPr lang="en-US" smtClean="0"/>
+              <a:rPr lang="en-US"/>
               <a:t>Click to edit Master title style</a:t>
             </a:r>
-            <a:endParaRPr lang="en-US"/>
           </a:p>
         </p:txBody>
       </p:sp>
@@ -2163,7 +2160,7 @@
           <a:p>
             <a:fld id="{3077A4E5-CCAE-9B45-AA32-A479F3595CC3}" type="datetime1">
               <a:rPr lang="en-US" smtClean="0"/>
-              <a:t>8/3/18</a:t>
+              <a:t>8/14/18</a:t>
             </a:fld>
             <a:endParaRPr lang="en-US"/>
           </a:p>
@@ -2258,7 +2255,7 @@
           <a:p>
             <a:fld id="{46836B2E-85C4-6F4D-BEDA-4D25492BFACA}" type="datetime1">
               <a:rPr lang="en-US" smtClean="0"/>
-              <a:t>8/3/18</a:t>
+              <a:t>8/14/18</a:t>
             </a:fld>
             <a:endParaRPr lang="en-US"/>
           </a:p>
@@ -2361,10 +2358,9 @@
           </a:lstStyle>
           <a:p>
             <a:r>
-              <a:rPr lang="en-US" smtClean="0"/>
+              <a:rPr lang="en-US"/>
               <a:t>Click to edit Master title style</a:t>
             </a:r>
-            <a:endParaRPr lang="en-US"/>
           </a:p>
         </p:txBody>
       </p:sp>
@@ -2418,38 +2414,37 @@
           <a:p>
             <a:pPr lvl="0"/>
             <a:r>
-              <a:rPr lang="en-US" smtClean="0"/>
+              <a:rPr lang="en-US"/>
               <a:t>Click to edit Master text styles</a:t>
             </a:r>
           </a:p>
           <a:p>
             <a:pPr lvl="1"/>
             <a:r>
-              <a:rPr lang="en-US" smtClean="0"/>
+              <a:rPr lang="en-US"/>
               <a:t>Second level</a:t>
             </a:r>
           </a:p>
           <a:p>
             <a:pPr lvl="2"/>
             <a:r>
-              <a:rPr lang="en-US" smtClean="0"/>
+              <a:rPr lang="en-US"/>
               <a:t>Third level</a:t>
             </a:r>
           </a:p>
           <a:p>
             <a:pPr lvl="3"/>
             <a:r>
-              <a:rPr lang="en-US" smtClean="0"/>
+              <a:rPr lang="en-US"/>
               <a:t>Fourth level</a:t>
             </a:r>
           </a:p>
           <a:p>
             <a:pPr lvl="4"/>
             <a:r>
-              <a:rPr lang="en-US" smtClean="0"/>
+              <a:rPr lang="en-US"/>
               <a:t>Fifth level</a:t>
             </a:r>
-            <a:endParaRPr lang="en-US"/>
           </a:p>
         </p:txBody>
       </p:sp>
@@ -2512,7 +2507,7 @@
           <a:p>
             <a:pPr lvl="0"/>
             <a:r>
-              <a:rPr lang="en-US" smtClean="0"/>
+              <a:rPr lang="en-US"/>
               <a:t>Click to edit Master text styles</a:t>
             </a:r>
           </a:p>
@@ -2535,7 +2530,7 @@
           <a:p>
             <a:fld id="{E5ECD924-4C7C-DC41-9F12-35DB45EADD4D}" type="datetime1">
               <a:rPr lang="en-US" smtClean="0"/>
-              <a:t>8/3/18</a:t>
+              <a:t>8/14/18</a:t>
             </a:fld>
             <a:endParaRPr lang="en-US"/>
           </a:p>
@@ -2638,10 +2633,9 @@
           </a:lstStyle>
           <a:p>
             <a:r>
-              <a:rPr lang="en-US" smtClean="0"/>
+              <a:rPr lang="en-US"/>
               <a:t>Click to edit Master title style</a:t>
             </a:r>
-            <a:endParaRPr lang="en-US"/>
           </a:p>
         </p:txBody>
       </p:sp>
@@ -2765,7 +2759,7 @@
           <a:p>
             <a:pPr lvl="0"/>
             <a:r>
-              <a:rPr lang="en-US" smtClean="0"/>
+              <a:rPr lang="en-US"/>
               <a:t>Click to edit Master text styles</a:t>
             </a:r>
           </a:p>
@@ -2788,7 +2782,7 @@
           <a:p>
             <a:fld id="{EFD44A18-2017-B94B-A711-E6FB904F54B1}" type="datetime1">
               <a:rPr lang="en-US" smtClean="0"/>
-              <a:t>8/3/18</a:t>
+              <a:t>8/14/18</a:t>
             </a:fld>
             <a:endParaRPr lang="en-US"/>
           </a:p>
@@ -2897,10 +2891,9 @@
           <a:lstStyle/>
           <a:p>
             <a:r>
-              <a:rPr lang="en-US" smtClean="0"/>
+              <a:rPr lang="en-US"/>
               <a:t>Click to edit Master title style</a:t>
             </a:r>
-            <a:endParaRPr lang="en-US"/>
           </a:p>
         </p:txBody>
       </p:sp>
@@ -2931,38 +2924,37 @@
           <a:p>
             <a:pPr lvl="0"/>
             <a:r>
-              <a:rPr lang="en-US" smtClean="0"/>
+              <a:rPr lang="en-US"/>
               <a:t>Click to edit Master text styles</a:t>
             </a:r>
           </a:p>
           <a:p>
             <a:pPr lvl="1"/>
             <a:r>
-              <a:rPr lang="en-US" smtClean="0"/>
+              <a:rPr lang="en-US"/>
               <a:t>Second level</a:t>
             </a:r>
           </a:p>
           <a:p>
             <a:pPr lvl="2"/>
             <a:r>
-              <a:rPr lang="en-US" smtClean="0"/>
+              <a:rPr lang="en-US"/>
               <a:t>Third level</a:t>
             </a:r>
           </a:p>
           <a:p>
             <a:pPr lvl="3"/>
             <a:r>
-              <a:rPr lang="en-US" smtClean="0"/>
+              <a:rPr lang="en-US"/>
               <a:t>Fourth level</a:t>
             </a:r>
           </a:p>
           <a:p>
             <a:pPr lvl="4"/>
             <a:r>
-              <a:rPr lang="en-US" smtClean="0"/>
+              <a:rPr lang="en-US"/>
               <a:t>Fifth level</a:t>
             </a:r>
-            <a:endParaRPr lang="en-US"/>
           </a:p>
         </p:txBody>
       </p:sp>
@@ -3001,7 +2993,7 @@
           <a:p>
             <a:fld id="{1B8845B9-D71D-694D-A2CD-4D56C58E906B}" type="datetime1">
               <a:rPr lang="en-US" smtClean="0"/>
-              <a:t>8/3/18</a:t>
+              <a:t>8/14/18</a:t>
             </a:fld>
             <a:endParaRPr lang="en-US"/>
           </a:p>
@@ -3478,13 +3470,1159 @@
   <p:clrMapOvr>
     <a:masterClrMapping/>
   </p:clrMapOvr>
-  <p:timing>
-    <p:tnLst>
-      <p:par>
-        <p:cTn id="1" dur="indefinite" restart="never" nodeType="tmRoot"/>
-      </p:par>
-    </p:tnLst>
-  </p:timing>
+</p:sld>
+</file>
+
+<file path=ppt/slides/slide10.xml><?xml version="1.0" encoding="utf-8"?>
+<p:sld xmlns:a="http://schemas.openxmlformats.org/drawingml/2006/main" xmlns:r="http://schemas.openxmlformats.org/officeDocument/2006/relationships" xmlns:p="http://schemas.openxmlformats.org/presentationml/2006/main">
+  <p:cSld>
+    <p:spTree>
+      <p:nvGrpSpPr>
+        <p:cNvPr id="1" name=""/>
+        <p:cNvGrpSpPr/>
+        <p:nvPr/>
+      </p:nvGrpSpPr>
+      <p:grpSpPr>
+        <a:xfrm>
+          <a:off x="0" y="0"/>
+          <a:ext cx="0" cy="0"/>
+          <a:chOff x="0" y="0"/>
+          <a:chExt cx="0" cy="0"/>
+        </a:xfrm>
+      </p:grpSpPr>
+      <p:sp>
+        <p:nvSpPr>
+          <p:cNvPr id="2" name="Title 1">
+            <a:extLst>
+              <a:ext uri="{FF2B5EF4-FFF2-40B4-BE49-F238E27FC236}">
+                <a16:creationId xmlns:a16="http://schemas.microsoft.com/office/drawing/2014/main" id="{CC5AF20C-BCC7-7444-86B9-B2930C74AB59}"/>
+              </a:ext>
+            </a:extLst>
+          </p:cNvPr>
+          <p:cNvSpPr>
+            <a:spLocks noGrp="1"/>
+          </p:cNvSpPr>
+          <p:nvPr>
+            <p:ph type="title"/>
+          </p:nvPr>
+        </p:nvSpPr>
+        <p:spPr/>
+        <p:txBody>
+          <a:bodyPr/>
+          <a:lstStyle/>
+          <a:p>
+            <a:r>
+              <a:rPr lang="en-US" dirty="0"/>
+              <a:t>Naive Method</a:t>
+            </a:r>
+          </a:p>
+        </p:txBody>
+      </p:sp>
+      <p:sp>
+        <p:nvSpPr>
+          <p:cNvPr id="4" name="Slide Number Placeholder 3">
+            <a:extLst>
+              <a:ext uri="{FF2B5EF4-FFF2-40B4-BE49-F238E27FC236}">
+                <a16:creationId xmlns:a16="http://schemas.microsoft.com/office/drawing/2014/main" id="{70EFF405-D7AA-C440-B2A1-0107C19540BE}"/>
+              </a:ext>
+            </a:extLst>
+          </p:cNvPr>
+          <p:cNvSpPr>
+            <a:spLocks noGrp="1"/>
+          </p:cNvSpPr>
+          <p:nvPr>
+            <p:ph type="sldNum" sz="quarter" idx="12"/>
+          </p:nvPr>
+        </p:nvSpPr>
+        <p:spPr/>
+        <p:txBody>
+          <a:bodyPr/>
+          <a:lstStyle/>
+          <a:p>
+            <a:fld id="{2CC1335D-5C6A-0B42-9745-CD5AAF743FE7}" type="slidenum">
+              <a:rPr lang="en-US" smtClean="0"/>
+              <a:t>10</a:t>
+            </a:fld>
+            <a:endParaRPr lang="en-US"/>
+          </a:p>
+        </p:txBody>
+      </p:sp>
+      <p:pic>
+        <p:nvPicPr>
+          <p:cNvPr id="5" name="Picture 4">
+            <a:extLst>
+              <a:ext uri="{FF2B5EF4-FFF2-40B4-BE49-F238E27FC236}">
+                <a16:creationId xmlns:a16="http://schemas.microsoft.com/office/drawing/2014/main" id="{54DBD8B3-A405-634A-B40D-2C9BF8B7DDAB}"/>
+              </a:ext>
+            </a:extLst>
+          </p:cNvPr>
+          <p:cNvPicPr>
+            <a:picLocks noChangeAspect="1"/>
+          </p:cNvPicPr>
+          <p:nvPr/>
+        </p:nvPicPr>
+        <p:blipFill>
+          <a:blip r:embed="rId2"/>
+          <a:stretch>
+            <a:fillRect/>
+          </a:stretch>
+        </p:blipFill>
+        <p:spPr>
+          <a:xfrm>
+            <a:off x="1018627" y="1690688"/>
+            <a:ext cx="4521200" cy="4813300"/>
+          </a:xfrm>
+          <a:prstGeom prst="rect">
+            <a:avLst/>
+          </a:prstGeom>
+        </p:spPr>
+      </p:pic>
+      <p:grpSp>
+        <p:nvGrpSpPr>
+          <p:cNvPr id="15" name="Group 14">
+            <a:extLst>
+              <a:ext uri="{FF2B5EF4-FFF2-40B4-BE49-F238E27FC236}">
+                <a16:creationId xmlns:a16="http://schemas.microsoft.com/office/drawing/2014/main" id="{25F20353-BAF1-1F42-89CB-19D182AFD135}"/>
+              </a:ext>
+            </a:extLst>
+          </p:cNvPr>
+          <p:cNvGrpSpPr/>
+          <p:nvPr/>
+        </p:nvGrpSpPr>
+        <p:grpSpPr>
+          <a:xfrm>
+            <a:off x="6045724" y="2840378"/>
+            <a:ext cx="6146276" cy="1177245"/>
+            <a:chOff x="6045724" y="2840378"/>
+            <a:chExt cx="6146276" cy="1177245"/>
+          </a:xfrm>
+        </p:grpSpPr>
+        <p:grpSp>
+          <p:nvGrpSpPr>
+            <p:cNvPr id="13" name="Group 12">
+              <a:extLst>
+                <a:ext uri="{FF2B5EF4-FFF2-40B4-BE49-F238E27FC236}">
+                  <a16:creationId xmlns:a16="http://schemas.microsoft.com/office/drawing/2014/main" id="{72361754-C11E-9F44-B967-8C084A547B78}"/>
+                </a:ext>
+              </a:extLst>
+            </p:cNvPr>
+            <p:cNvGrpSpPr/>
+            <p:nvPr/>
+          </p:nvGrpSpPr>
+          <p:grpSpPr>
+            <a:xfrm>
+              <a:off x="6045724" y="2840378"/>
+              <a:ext cx="6146276" cy="1177245"/>
+              <a:chOff x="5788058" y="2190142"/>
+              <a:chExt cx="6146276" cy="1177245"/>
+            </a:xfrm>
+          </p:grpSpPr>
+          <p:sp>
+            <p:nvSpPr>
+              <p:cNvPr id="8" name="TextBox 7">
+                <a:extLst>
+                  <a:ext uri="{FF2B5EF4-FFF2-40B4-BE49-F238E27FC236}">
+                    <a16:creationId xmlns:a16="http://schemas.microsoft.com/office/drawing/2014/main" id="{38EA6B60-9D91-E54A-8718-CFDE5521BB4C}"/>
+                  </a:ext>
+                </a:extLst>
+              </p:cNvPr>
+              <p:cNvSpPr txBox="1"/>
+              <p:nvPr/>
+            </p:nvSpPr>
+            <p:spPr>
+              <a:xfrm>
+                <a:off x="5788058" y="2190142"/>
+                <a:ext cx="5664499" cy="369332"/>
+              </a:xfrm>
+              <a:prstGeom prst="rect">
+                <a:avLst/>
+              </a:prstGeom>
+              <a:noFill/>
+            </p:spPr>
+            <p:txBody>
+              <a:bodyPr wrap="none" rtlCol="0">
+                <a:spAutoFit/>
+              </a:bodyPr>
+              <a:lstStyle/>
+              <a:p>
+                <a:r>
+                  <a:rPr lang="en-US" dirty="0"/>
+                  <a:t>Map </a:t>
+                </a:r>
+                <a:r>
+                  <a:rPr lang="en-US" dirty="0" err="1"/>
+                  <a:t>λ</a:t>
+                </a:r>
+                <a:r>
+                  <a:rPr lang="en-US" dirty="0"/>
+                  <a:t> to </a:t>
+                </a:r>
+                <a:r>
+                  <a:rPr lang="en-US" dirty="0" err="1"/>
+                  <a:t>threadIdx.x</a:t>
+                </a:r>
+                <a:r>
+                  <a:rPr lang="en-US" dirty="0"/>
+                  <a:t>, p to </a:t>
+                </a:r>
+                <a:r>
+                  <a:rPr lang="en-US" dirty="0" err="1"/>
+                  <a:t>threadIdx.y</a:t>
+                </a:r>
+                <a:r>
+                  <a:rPr lang="en-US" dirty="0"/>
+                  <a:t> and q to </a:t>
+                </a:r>
+                <a:r>
+                  <a:rPr lang="en-US" dirty="0" err="1"/>
+                  <a:t>threadIdx.z</a:t>
+                </a:r>
+                <a:endParaRPr lang="en-US" dirty="0"/>
+              </a:p>
+            </p:txBody>
+          </p:sp>
+          <p:sp>
+            <p:nvSpPr>
+              <p:cNvPr id="10" name="TextBox 9">
+                <a:extLst>
+                  <a:ext uri="{FF2B5EF4-FFF2-40B4-BE49-F238E27FC236}">
+                    <a16:creationId xmlns:a16="http://schemas.microsoft.com/office/drawing/2014/main" id="{DE6D441A-D94B-2E42-96E2-656DDCF93F55}"/>
+                  </a:ext>
+                </a:extLst>
+              </p:cNvPr>
+              <p:cNvSpPr txBox="1"/>
+              <p:nvPr/>
+            </p:nvSpPr>
+            <p:spPr>
+              <a:xfrm>
+                <a:off x="5788058" y="2721056"/>
+                <a:ext cx="6146276" cy="646331"/>
+              </a:xfrm>
+              <a:prstGeom prst="rect">
+                <a:avLst/>
+              </a:prstGeom>
+              <a:noFill/>
+            </p:spPr>
+            <p:txBody>
+              <a:bodyPr wrap="square" rtlCol="0">
+                <a:spAutoFit/>
+              </a:bodyPr>
+              <a:lstStyle/>
+              <a:p>
+                <a:r>
+                  <a:rPr lang="en-US" dirty="0"/>
+                  <a:t>Block dimensions would be (1, 32, 32) and the grid would have</a:t>
+                </a:r>
+              </a:p>
+              <a:p>
+                <a:r>
+                  <a:rPr lang="en-US" dirty="0"/>
+                  <a:t>dimensions of </a:t>
+                </a:r>
+                <a:endParaRPr lang="en-US" i="1" dirty="0"/>
+              </a:p>
+            </p:txBody>
+          </p:sp>
+        </p:grpSp>
+        <p:pic>
+          <p:nvPicPr>
+            <p:cNvPr id="14" name="Picture 13">
+              <a:extLst>
+                <a:ext uri="{FF2B5EF4-FFF2-40B4-BE49-F238E27FC236}">
+                  <a16:creationId xmlns:a16="http://schemas.microsoft.com/office/drawing/2014/main" id="{8A38944B-DDAA-1340-B099-59A9C989E4E5}"/>
+                </a:ext>
+              </a:extLst>
+            </p:cNvPr>
+            <p:cNvPicPr>
+              <a:picLocks noChangeAspect="1"/>
+            </p:cNvPicPr>
+            <p:nvPr/>
+          </p:nvPicPr>
+          <p:blipFill>
+            <a:blip r:embed="rId3"/>
+            <a:stretch>
+              <a:fillRect/>
+            </a:stretch>
+          </p:blipFill>
+          <p:spPr>
+            <a:xfrm>
+              <a:off x="7613650" y="3694457"/>
+              <a:ext cx="1993900" cy="279400"/>
+            </a:xfrm>
+            <a:prstGeom prst="rect">
+              <a:avLst/>
+            </a:prstGeom>
+          </p:spPr>
+        </p:pic>
+      </p:grpSp>
+    </p:spTree>
+    <p:extLst>
+      <p:ext uri="{BB962C8B-B14F-4D97-AF65-F5344CB8AC3E}">
+        <p14:creationId xmlns:p14="http://schemas.microsoft.com/office/powerpoint/2010/main" val="527871202"/>
+      </p:ext>
+    </p:extLst>
+  </p:cSld>
+  <p:clrMapOvr>
+    <a:masterClrMapping/>
+  </p:clrMapOvr>
+</p:sld>
+</file>
+
+<file path=ppt/slides/slide11.xml><?xml version="1.0" encoding="utf-8"?>
+<p:sld xmlns:a="http://schemas.openxmlformats.org/drawingml/2006/main" xmlns:r="http://schemas.openxmlformats.org/officeDocument/2006/relationships" xmlns:p="http://schemas.openxmlformats.org/presentationml/2006/main">
+  <p:cSld>
+    <p:spTree>
+      <p:nvGrpSpPr>
+        <p:cNvPr id="1" name=""/>
+        <p:cNvGrpSpPr/>
+        <p:nvPr/>
+      </p:nvGrpSpPr>
+      <p:grpSpPr>
+        <a:xfrm>
+          <a:off x="0" y="0"/>
+          <a:ext cx="0" cy="0"/>
+          <a:chOff x="0" y="0"/>
+          <a:chExt cx="0" cy="0"/>
+        </a:xfrm>
+      </p:grpSpPr>
+      <p:sp>
+        <p:nvSpPr>
+          <p:cNvPr id="2" name="Title 1">
+            <a:extLst>
+              <a:ext uri="{FF2B5EF4-FFF2-40B4-BE49-F238E27FC236}">
+                <a16:creationId xmlns:a16="http://schemas.microsoft.com/office/drawing/2014/main" id="{D828EEF6-28AE-2749-B7FC-09400D064931}"/>
+              </a:ext>
+            </a:extLst>
+          </p:cNvPr>
+          <p:cNvSpPr>
+            <a:spLocks noGrp="1"/>
+          </p:cNvSpPr>
+          <p:nvPr>
+            <p:ph type="title"/>
+          </p:nvPr>
+        </p:nvSpPr>
+        <p:spPr/>
+        <p:txBody>
+          <a:bodyPr/>
+          <a:lstStyle/>
+          <a:p>
+            <a:r>
+              <a:rPr lang="en-US" dirty="0"/>
+              <a:t>Naive Method</a:t>
+            </a:r>
+          </a:p>
+        </p:txBody>
+      </p:sp>
+      <p:sp>
+        <p:nvSpPr>
+          <p:cNvPr id="4" name="Slide Number Placeholder 3">
+            <a:extLst>
+              <a:ext uri="{FF2B5EF4-FFF2-40B4-BE49-F238E27FC236}">
+                <a16:creationId xmlns:a16="http://schemas.microsoft.com/office/drawing/2014/main" id="{070865B7-8942-3E4D-A3EB-138663283C76}"/>
+              </a:ext>
+            </a:extLst>
+          </p:cNvPr>
+          <p:cNvSpPr>
+            <a:spLocks noGrp="1"/>
+          </p:cNvSpPr>
+          <p:nvPr>
+            <p:ph type="sldNum" sz="quarter" idx="12"/>
+          </p:nvPr>
+        </p:nvSpPr>
+        <p:spPr/>
+        <p:txBody>
+          <a:bodyPr/>
+          <a:lstStyle/>
+          <a:p>
+            <a:fld id="{2CC1335D-5C6A-0B42-9745-CD5AAF743FE7}" type="slidenum">
+              <a:rPr lang="en-US" smtClean="0"/>
+              <a:t>11</a:t>
+            </a:fld>
+            <a:endParaRPr lang="en-US"/>
+          </a:p>
+        </p:txBody>
+      </p:sp>
+      <p:pic>
+        <p:nvPicPr>
+          <p:cNvPr id="6" name="Picture 5">
+            <a:extLst>
+              <a:ext uri="{FF2B5EF4-FFF2-40B4-BE49-F238E27FC236}">
+                <a16:creationId xmlns:a16="http://schemas.microsoft.com/office/drawing/2014/main" id="{D0F302F3-C0B1-3445-AB9E-3BC34CAC22C5}"/>
+              </a:ext>
+            </a:extLst>
+          </p:cNvPr>
+          <p:cNvPicPr>
+            <a:picLocks noChangeAspect="1"/>
+          </p:cNvPicPr>
+          <p:nvPr/>
+        </p:nvPicPr>
+        <p:blipFill>
+          <a:blip r:embed="rId2"/>
+          <a:stretch>
+            <a:fillRect/>
+          </a:stretch>
+        </p:blipFill>
+        <p:spPr>
+          <a:xfrm>
+            <a:off x="1186684" y="1387343"/>
+            <a:ext cx="5140544" cy="5272353"/>
+          </a:xfrm>
+          <a:prstGeom prst="rect">
+            <a:avLst/>
+          </a:prstGeom>
+        </p:spPr>
+      </p:pic>
+      <p:sp>
+        <p:nvSpPr>
+          <p:cNvPr id="7" name="TextBox 6">
+            <a:extLst>
+              <a:ext uri="{FF2B5EF4-FFF2-40B4-BE49-F238E27FC236}">
+                <a16:creationId xmlns:a16="http://schemas.microsoft.com/office/drawing/2014/main" id="{9E12F651-8667-6C4A-9230-DB0A1E42EA12}"/>
+              </a:ext>
+            </a:extLst>
+          </p:cNvPr>
+          <p:cNvSpPr txBox="1"/>
+          <p:nvPr/>
+        </p:nvSpPr>
+        <p:spPr>
+          <a:xfrm>
+            <a:off x="6927835" y="3284855"/>
+            <a:ext cx="4709238" cy="1477328"/>
+          </a:xfrm>
+          <a:prstGeom prst="rect">
+            <a:avLst/>
+          </a:prstGeom>
+          <a:noFill/>
+        </p:spPr>
+        <p:txBody>
+          <a:bodyPr wrap="none" rtlCol="0">
+            <a:spAutoFit/>
+          </a:bodyPr>
+          <a:lstStyle/>
+          <a:p>
+            <a:r>
+              <a:rPr lang="en-US" dirty="0"/>
+              <a:t>Basis set of size </a:t>
+            </a:r>
+            <a:r>
+              <a:rPr lang="en-CA" dirty="0"/>
+              <a:t>(30,25,25,20,20,15,15). </a:t>
+            </a:r>
+          </a:p>
+          <a:p>
+            <a:endParaRPr lang="en-CA" dirty="0"/>
+          </a:p>
+          <a:p>
+            <a:r>
+              <a:rPr lang="en-CA" dirty="0"/>
+              <a:t>The </a:t>
+            </a:r>
+            <a:r>
+              <a:rPr lang="en-CA" dirty="0" err="1"/>
+              <a:t>blockDim</a:t>
+            </a:r>
+            <a:r>
+              <a:rPr lang="en-CA" dirty="0"/>
+              <a:t> = (1,32,32) and </a:t>
+            </a:r>
+            <a:r>
+              <a:rPr lang="en-CA" dirty="0" err="1"/>
+              <a:t>gridDim</a:t>
+            </a:r>
+            <a:r>
+              <a:rPr lang="en-CA" dirty="0"/>
+              <a:t> = (7,1,1)</a:t>
+            </a:r>
+          </a:p>
+          <a:p>
+            <a:endParaRPr lang="en-CA" dirty="0"/>
+          </a:p>
+          <a:p>
+            <a:r>
+              <a:rPr lang="en-CA" dirty="0"/>
+              <a:t>Workload is not distributed to threads very well.</a:t>
+            </a:r>
+          </a:p>
+        </p:txBody>
+      </p:sp>
+      <p:sp>
+        <p:nvSpPr>
+          <p:cNvPr id="8" name="TextBox 7">
+            <a:extLst>
+              <a:ext uri="{FF2B5EF4-FFF2-40B4-BE49-F238E27FC236}">
+                <a16:creationId xmlns:a16="http://schemas.microsoft.com/office/drawing/2014/main" id="{8D4F4D9B-E4DC-8E43-A555-7D320424B579}"/>
+              </a:ext>
+            </a:extLst>
+          </p:cNvPr>
+          <p:cNvSpPr txBox="1"/>
+          <p:nvPr/>
+        </p:nvSpPr>
+        <p:spPr>
+          <a:xfrm>
+            <a:off x="2055043" y="365125"/>
+            <a:ext cx="4655185" cy="369332"/>
+          </a:xfrm>
+          <a:prstGeom prst="rect">
+            <a:avLst/>
+          </a:prstGeom>
+          <a:noFill/>
+        </p:spPr>
+        <p:txBody>
+          <a:bodyPr wrap="none" rtlCol="0">
+            <a:spAutoFit/>
+          </a:bodyPr>
+          <a:lstStyle/>
+          <a:p>
+            <a:r>
+              <a:rPr lang="en-US" dirty="0" err="1"/>
+              <a:t>Notetodylan</a:t>
+            </a:r>
+            <a:r>
+              <a:rPr lang="en-US" dirty="0"/>
+              <a:t> remake the figure so it’s horizontal</a:t>
+            </a:r>
+          </a:p>
+        </p:txBody>
+      </p:sp>
+    </p:spTree>
+    <p:extLst>
+      <p:ext uri="{BB962C8B-B14F-4D97-AF65-F5344CB8AC3E}">
+        <p14:creationId xmlns:p14="http://schemas.microsoft.com/office/powerpoint/2010/main" val="3602772309"/>
+      </p:ext>
+    </p:extLst>
+  </p:cSld>
+  <p:clrMapOvr>
+    <a:masterClrMapping/>
+  </p:clrMapOvr>
+</p:sld>
+</file>
+
+<file path=ppt/slides/slide12.xml><?xml version="1.0" encoding="utf-8"?>
+<p:sld xmlns:a="http://schemas.openxmlformats.org/drawingml/2006/main" xmlns:r="http://schemas.openxmlformats.org/officeDocument/2006/relationships" xmlns:p="http://schemas.openxmlformats.org/presentationml/2006/main">
+  <p:cSld>
+    <p:spTree>
+      <p:nvGrpSpPr>
+        <p:cNvPr id="1" name=""/>
+        <p:cNvGrpSpPr/>
+        <p:nvPr/>
+      </p:nvGrpSpPr>
+      <p:grpSpPr>
+        <a:xfrm>
+          <a:off x="0" y="0"/>
+          <a:ext cx="0" cy="0"/>
+          <a:chOff x="0" y="0"/>
+          <a:chExt cx="0" cy="0"/>
+        </a:xfrm>
+      </p:grpSpPr>
+      <p:sp>
+        <p:nvSpPr>
+          <p:cNvPr id="2" name="Title 1">
+            <a:extLst>
+              <a:ext uri="{FF2B5EF4-FFF2-40B4-BE49-F238E27FC236}">
+                <a16:creationId xmlns:a16="http://schemas.microsoft.com/office/drawing/2014/main" id="{93AF5493-3FAA-3442-AC37-6C8AEB8F610D}"/>
+              </a:ext>
+            </a:extLst>
+          </p:cNvPr>
+          <p:cNvSpPr>
+            <a:spLocks noGrp="1"/>
+          </p:cNvSpPr>
+          <p:nvPr>
+            <p:ph type="title"/>
+          </p:nvPr>
+        </p:nvSpPr>
+        <p:spPr/>
+        <p:txBody>
+          <a:bodyPr/>
+          <a:lstStyle/>
+          <a:p>
+            <a:r>
+              <a:rPr lang="en-US" dirty="0"/>
+              <a:t>Two-Dimensional Solution</a:t>
+            </a:r>
+          </a:p>
+        </p:txBody>
+      </p:sp>
+      <p:sp>
+        <p:nvSpPr>
+          <p:cNvPr id="4" name="Slide Number Placeholder 3">
+            <a:extLst>
+              <a:ext uri="{FF2B5EF4-FFF2-40B4-BE49-F238E27FC236}">
+                <a16:creationId xmlns:a16="http://schemas.microsoft.com/office/drawing/2014/main" id="{F5F0C81C-0A8B-EB48-94B9-3CAA99791403}"/>
+              </a:ext>
+            </a:extLst>
+          </p:cNvPr>
+          <p:cNvSpPr>
+            <a:spLocks noGrp="1"/>
+          </p:cNvSpPr>
+          <p:nvPr>
+            <p:ph type="sldNum" sz="quarter" idx="12"/>
+          </p:nvPr>
+        </p:nvSpPr>
+        <p:spPr/>
+        <p:txBody>
+          <a:bodyPr/>
+          <a:lstStyle/>
+          <a:p>
+            <a:fld id="{2CC1335D-5C6A-0B42-9745-CD5AAF743FE7}" type="slidenum">
+              <a:rPr lang="en-US" smtClean="0"/>
+              <a:t>12</a:t>
+            </a:fld>
+            <a:endParaRPr lang="en-US"/>
+          </a:p>
+        </p:txBody>
+      </p:sp>
+      <p:pic>
+        <p:nvPicPr>
+          <p:cNvPr id="6" name="Picture 5">
+            <a:extLst>
+              <a:ext uri="{FF2B5EF4-FFF2-40B4-BE49-F238E27FC236}">
+                <a16:creationId xmlns:a16="http://schemas.microsoft.com/office/drawing/2014/main" id="{3DAC93D3-1A3E-BA42-ACB8-BECEBD84F386}"/>
+              </a:ext>
+            </a:extLst>
+          </p:cNvPr>
+          <p:cNvPicPr>
+            <a:picLocks noChangeAspect="1"/>
+          </p:cNvPicPr>
+          <p:nvPr/>
+        </p:nvPicPr>
+        <p:blipFill>
+          <a:blip r:embed="rId2"/>
+          <a:stretch>
+            <a:fillRect/>
+          </a:stretch>
+        </p:blipFill>
+        <p:spPr>
+          <a:xfrm>
+            <a:off x="1409398" y="1485607"/>
+            <a:ext cx="5085996" cy="5075824"/>
+          </a:xfrm>
+          <a:prstGeom prst="rect">
+            <a:avLst/>
+          </a:prstGeom>
+        </p:spPr>
+      </p:pic>
+      <p:sp>
+        <p:nvSpPr>
+          <p:cNvPr id="7" name="TextBox 6">
+            <a:extLst>
+              <a:ext uri="{FF2B5EF4-FFF2-40B4-BE49-F238E27FC236}">
+                <a16:creationId xmlns:a16="http://schemas.microsoft.com/office/drawing/2014/main" id="{FA827FAF-FA67-DF4C-AE14-F0757EA83C47}"/>
+              </a:ext>
+            </a:extLst>
+          </p:cNvPr>
+          <p:cNvSpPr txBox="1"/>
+          <p:nvPr/>
+        </p:nvSpPr>
+        <p:spPr>
+          <a:xfrm>
+            <a:off x="6837992" y="3048000"/>
+            <a:ext cx="4930324" cy="1200329"/>
+          </a:xfrm>
+          <a:prstGeom prst="rect">
+            <a:avLst/>
+          </a:prstGeom>
+          <a:noFill/>
+        </p:spPr>
+        <p:txBody>
+          <a:bodyPr wrap="none" rtlCol="0">
+            <a:spAutoFit/>
+          </a:bodyPr>
+          <a:lstStyle/>
+          <a:p>
+            <a:r>
+              <a:rPr lang="en-US" dirty="0"/>
+              <a:t>Better because each thread is now only calculating</a:t>
+            </a:r>
+          </a:p>
+          <a:p>
+            <a:r>
+              <a:rPr lang="en-US" dirty="0"/>
+              <a:t>one set of integrals</a:t>
+            </a:r>
+          </a:p>
+          <a:p>
+            <a:endParaRPr lang="en-US" dirty="0"/>
+          </a:p>
+          <a:p>
+            <a:r>
+              <a:rPr lang="en-US" dirty="0"/>
+              <a:t>Still have issues with blocks containing idle threads</a:t>
+            </a:r>
+          </a:p>
+        </p:txBody>
+      </p:sp>
+    </p:spTree>
+    <p:extLst>
+      <p:ext uri="{BB962C8B-B14F-4D97-AF65-F5344CB8AC3E}">
+        <p14:creationId xmlns:p14="http://schemas.microsoft.com/office/powerpoint/2010/main" val="2151608745"/>
+      </p:ext>
+    </p:extLst>
+  </p:cSld>
+  <p:clrMapOvr>
+    <a:masterClrMapping/>
+  </p:clrMapOvr>
+</p:sld>
+</file>
+
+<file path=ppt/slides/slide13.xml><?xml version="1.0" encoding="utf-8"?>
+<p:sld xmlns:a="http://schemas.openxmlformats.org/drawingml/2006/main" xmlns:r="http://schemas.openxmlformats.org/officeDocument/2006/relationships" xmlns:p="http://schemas.openxmlformats.org/presentationml/2006/main">
+  <p:cSld>
+    <p:spTree>
+      <p:nvGrpSpPr>
+        <p:cNvPr id="1" name=""/>
+        <p:cNvGrpSpPr/>
+        <p:nvPr/>
+      </p:nvGrpSpPr>
+      <p:grpSpPr>
+        <a:xfrm>
+          <a:off x="0" y="0"/>
+          <a:ext cx="0" cy="0"/>
+          <a:chOff x="0" y="0"/>
+          <a:chExt cx="0" cy="0"/>
+        </a:xfrm>
+      </p:grpSpPr>
+      <p:sp>
+        <p:nvSpPr>
+          <p:cNvPr id="2" name="Title 1">
+            <a:extLst>
+              <a:ext uri="{FF2B5EF4-FFF2-40B4-BE49-F238E27FC236}">
+                <a16:creationId xmlns:a16="http://schemas.microsoft.com/office/drawing/2014/main" id="{FA9BA8E4-842A-7249-B80D-6388AC4785A9}"/>
+              </a:ext>
+            </a:extLst>
+          </p:cNvPr>
+          <p:cNvSpPr>
+            <a:spLocks noGrp="1"/>
+          </p:cNvSpPr>
+          <p:nvPr>
+            <p:ph type="title"/>
+          </p:nvPr>
+        </p:nvSpPr>
+        <p:spPr/>
+        <p:txBody>
+          <a:bodyPr/>
+          <a:lstStyle/>
+          <a:p>
+            <a:r>
+              <a:rPr lang="en-US" dirty="0"/>
+              <a:t>One-Dimensional Solution</a:t>
+            </a:r>
+          </a:p>
+        </p:txBody>
+      </p:sp>
+      <p:sp>
+        <p:nvSpPr>
+          <p:cNvPr id="4" name="Slide Number Placeholder 3">
+            <a:extLst>
+              <a:ext uri="{FF2B5EF4-FFF2-40B4-BE49-F238E27FC236}">
+                <a16:creationId xmlns:a16="http://schemas.microsoft.com/office/drawing/2014/main" id="{0DDC1EFF-4A1D-FA43-A105-ED9BAE26BACC}"/>
+              </a:ext>
+            </a:extLst>
+          </p:cNvPr>
+          <p:cNvSpPr>
+            <a:spLocks noGrp="1"/>
+          </p:cNvSpPr>
+          <p:nvPr>
+            <p:ph type="sldNum" sz="quarter" idx="12"/>
+          </p:nvPr>
+        </p:nvSpPr>
+        <p:spPr/>
+        <p:txBody>
+          <a:bodyPr/>
+          <a:lstStyle/>
+          <a:p>
+            <a:fld id="{2CC1335D-5C6A-0B42-9745-CD5AAF743FE7}" type="slidenum">
+              <a:rPr lang="en-US" smtClean="0"/>
+              <a:t>13</a:t>
+            </a:fld>
+            <a:endParaRPr lang="en-US"/>
+          </a:p>
+        </p:txBody>
+      </p:sp>
+      <p:pic>
+        <p:nvPicPr>
+          <p:cNvPr id="6" name="Picture 5">
+            <a:extLst>
+              <a:ext uri="{FF2B5EF4-FFF2-40B4-BE49-F238E27FC236}">
+                <a16:creationId xmlns:a16="http://schemas.microsoft.com/office/drawing/2014/main" id="{3E4D66AC-2A48-4A44-86E9-BBB216E4E8BB}"/>
+              </a:ext>
+            </a:extLst>
+          </p:cNvPr>
+          <p:cNvPicPr>
+            <a:picLocks noChangeAspect="1"/>
+          </p:cNvPicPr>
+          <p:nvPr/>
+        </p:nvPicPr>
+        <p:blipFill>
+          <a:blip r:embed="rId2"/>
+          <a:stretch>
+            <a:fillRect/>
+          </a:stretch>
+        </p:blipFill>
+        <p:spPr>
+          <a:xfrm>
+            <a:off x="1645024" y="1377809"/>
+            <a:ext cx="3883417" cy="4978541"/>
+          </a:xfrm>
+          <a:prstGeom prst="rect">
+            <a:avLst/>
+          </a:prstGeom>
+        </p:spPr>
+      </p:pic>
+      <p:sp>
+        <p:nvSpPr>
+          <p:cNvPr id="7" name="TextBox 6">
+            <a:extLst>
+              <a:ext uri="{FF2B5EF4-FFF2-40B4-BE49-F238E27FC236}">
+                <a16:creationId xmlns:a16="http://schemas.microsoft.com/office/drawing/2014/main" id="{D23EE490-205A-8343-8B67-813F33BF7719}"/>
+              </a:ext>
+            </a:extLst>
+          </p:cNvPr>
+          <p:cNvSpPr txBox="1"/>
+          <p:nvPr/>
+        </p:nvSpPr>
+        <p:spPr>
+          <a:xfrm>
+            <a:off x="5641582" y="3054022"/>
+            <a:ext cx="6265048" cy="646331"/>
+          </a:xfrm>
+          <a:prstGeom prst="rect">
+            <a:avLst/>
+          </a:prstGeom>
+          <a:noFill/>
+        </p:spPr>
+        <p:txBody>
+          <a:bodyPr wrap="none" rtlCol="0">
+            <a:spAutoFit/>
+          </a:bodyPr>
+          <a:lstStyle/>
+          <a:p>
+            <a:r>
+              <a:rPr lang="en-US" dirty="0"/>
+              <a:t>Best solution because all threads have the same work load</a:t>
+            </a:r>
+          </a:p>
+          <a:p>
+            <a:r>
+              <a:rPr lang="en-US" dirty="0"/>
+              <a:t>and only the last block has the possibility of having idle threads </a:t>
+            </a:r>
+          </a:p>
+        </p:txBody>
+      </p:sp>
+    </p:spTree>
+    <p:extLst>
+      <p:ext uri="{BB962C8B-B14F-4D97-AF65-F5344CB8AC3E}">
+        <p14:creationId xmlns:p14="http://schemas.microsoft.com/office/powerpoint/2010/main" val="3370119644"/>
+      </p:ext>
+    </p:extLst>
+  </p:cSld>
+  <p:clrMapOvr>
+    <a:masterClrMapping/>
+  </p:clrMapOvr>
+</p:sld>
+</file>
+
+<file path=ppt/slides/slide14.xml><?xml version="1.0" encoding="utf-8"?>
+<p:sld xmlns:a="http://schemas.openxmlformats.org/drawingml/2006/main" xmlns:r="http://schemas.openxmlformats.org/officeDocument/2006/relationships" xmlns:p="http://schemas.openxmlformats.org/presentationml/2006/main">
+  <p:cSld>
+    <p:spTree>
+      <p:nvGrpSpPr>
+        <p:cNvPr id="1" name=""/>
+        <p:cNvGrpSpPr/>
+        <p:nvPr/>
+      </p:nvGrpSpPr>
+      <p:grpSpPr>
+        <a:xfrm>
+          <a:off x="0" y="0"/>
+          <a:ext cx="0" cy="0"/>
+          <a:chOff x="0" y="0"/>
+          <a:chExt cx="0" cy="0"/>
+        </a:xfrm>
+      </p:grpSpPr>
+      <p:sp>
+        <p:nvSpPr>
+          <p:cNvPr id="2" name="Title 1">
+            <a:extLst>
+              <a:ext uri="{FF2B5EF4-FFF2-40B4-BE49-F238E27FC236}">
+                <a16:creationId xmlns:a16="http://schemas.microsoft.com/office/drawing/2014/main" id="{938B2311-8319-AE49-A46B-07AA8451D0FE}"/>
+              </a:ext>
+            </a:extLst>
+          </p:cNvPr>
+          <p:cNvSpPr>
+            <a:spLocks noGrp="1"/>
+          </p:cNvSpPr>
+          <p:nvPr>
+            <p:ph type="title"/>
+          </p:nvPr>
+        </p:nvSpPr>
+        <p:spPr/>
+        <p:txBody>
+          <a:bodyPr/>
+          <a:lstStyle/>
+          <a:p>
+            <a:r>
+              <a:rPr lang="en-US" dirty="0"/>
+              <a:t>Mapping Threads</a:t>
+            </a:r>
+          </a:p>
+        </p:txBody>
+      </p:sp>
+      <p:sp>
+        <p:nvSpPr>
+          <p:cNvPr id="4" name="Slide Number Placeholder 3">
+            <a:extLst>
+              <a:ext uri="{FF2B5EF4-FFF2-40B4-BE49-F238E27FC236}">
+                <a16:creationId xmlns:a16="http://schemas.microsoft.com/office/drawing/2014/main" id="{09A14E73-FE5F-4749-836F-3BC55D769282}"/>
+              </a:ext>
+            </a:extLst>
+          </p:cNvPr>
+          <p:cNvSpPr>
+            <a:spLocks noGrp="1"/>
+          </p:cNvSpPr>
+          <p:nvPr>
+            <p:ph type="sldNum" sz="quarter" idx="12"/>
+          </p:nvPr>
+        </p:nvSpPr>
+        <p:spPr/>
+        <p:txBody>
+          <a:bodyPr/>
+          <a:lstStyle/>
+          <a:p>
+            <a:fld id="{2CC1335D-5C6A-0B42-9745-CD5AAF743FE7}" type="slidenum">
+              <a:rPr lang="en-US" smtClean="0"/>
+              <a:t>14</a:t>
+            </a:fld>
+            <a:endParaRPr lang="en-US" dirty="0"/>
+          </a:p>
+        </p:txBody>
+      </p:sp>
+      <p:pic>
+        <p:nvPicPr>
+          <p:cNvPr id="9" name="Picture 8">
+            <a:extLst>
+              <a:ext uri="{FF2B5EF4-FFF2-40B4-BE49-F238E27FC236}">
+                <a16:creationId xmlns:a16="http://schemas.microsoft.com/office/drawing/2014/main" id="{62EA691D-CFE4-984C-B284-299D001F26E0}"/>
+              </a:ext>
+            </a:extLst>
+          </p:cNvPr>
+          <p:cNvPicPr>
+            <a:picLocks noChangeAspect="1"/>
+          </p:cNvPicPr>
+          <p:nvPr/>
+        </p:nvPicPr>
+        <p:blipFill>
+          <a:blip r:embed="rId2"/>
+          <a:stretch>
+            <a:fillRect/>
+          </a:stretch>
+        </p:blipFill>
+        <p:spPr>
+          <a:xfrm>
+            <a:off x="1862381" y="1285908"/>
+            <a:ext cx="5080603" cy="5070442"/>
+          </a:xfrm>
+          <a:prstGeom prst="rect">
+            <a:avLst/>
+          </a:prstGeom>
+        </p:spPr>
+      </p:pic>
+      <p:sp>
+        <p:nvSpPr>
+          <p:cNvPr id="12" name="TextBox 11">
+            <a:extLst>
+              <a:ext uri="{FF2B5EF4-FFF2-40B4-BE49-F238E27FC236}">
+                <a16:creationId xmlns:a16="http://schemas.microsoft.com/office/drawing/2014/main" id="{E492BC3E-F02F-F244-98B5-2A3B1E04B7EA}"/>
+              </a:ext>
+            </a:extLst>
+          </p:cNvPr>
+          <p:cNvSpPr txBox="1"/>
+          <p:nvPr/>
+        </p:nvSpPr>
+        <p:spPr>
+          <a:xfrm>
+            <a:off x="3079531" y="515007"/>
+            <a:ext cx="4690771" cy="369332"/>
+          </a:xfrm>
+          <a:prstGeom prst="rect">
+            <a:avLst/>
+          </a:prstGeom>
+          <a:noFill/>
+        </p:spPr>
+        <p:txBody>
+          <a:bodyPr wrap="none" rtlCol="0">
+            <a:spAutoFit/>
+          </a:bodyPr>
+          <a:lstStyle/>
+          <a:p>
+            <a:r>
+              <a:rPr lang="en-US" dirty="0"/>
+              <a:t>Note to Dylan: change L to lambda and M to mu</a:t>
+            </a:r>
+          </a:p>
+        </p:txBody>
+      </p:sp>
+      <p:pic>
+        <p:nvPicPr>
+          <p:cNvPr id="13" name="Picture 12">
+            <a:extLst>
+              <a:ext uri="{FF2B5EF4-FFF2-40B4-BE49-F238E27FC236}">
+                <a16:creationId xmlns:a16="http://schemas.microsoft.com/office/drawing/2014/main" id="{62817CBA-2978-054E-8AE8-D32B759B1447}"/>
+              </a:ext>
+            </a:extLst>
+          </p:cNvPr>
+          <p:cNvPicPr>
+            <a:picLocks noChangeAspect="1"/>
+          </p:cNvPicPr>
+          <p:nvPr/>
+        </p:nvPicPr>
+        <p:blipFill>
+          <a:blip r:embed="rId3"/>
+          <a:stretch>
+            <a:fillRect/>
+          </a:stretch>
+        </p:blipFill>
+        <p:spPr>
+          <a:xfrm>
+            <a:off x="6965755" y="2194692"/>
+            <a:ext cx="4734886" cy="2944868"/>
+          </a:xfrm>
+          <a:prstGeom prst="rect">
+            <a:avLst/>
+          </a:prstGeom>
+        </p:spPr>
+      </p:pic>
+      <p:sp>
+        <p:nvSpPr>
+          <p:cNvPr id="14" name="TextBox 13">
+            <a:extLst>
+              <a:ext uri="{FF2B5EF4-FFF2-40B4-BE49-F238E27FC236}">
+                <a16:creationId xmlns:a16="http://schemas.microsoft.com/office/drawing/2014/main" id="{F65DFF62-5C6C-9B4E-939F-4D873B567803}"/>
+              </a:ext>
+            </a:extLst>
+          </p:cNvPr>
+          <p:cNvSpPr txBox="1"/>
+          <p:nvPr/>
+        </p:nvSpPr>
+        <p:spPr>
+          <a:xfrm>
+            <a:off x="194765" y="3636463"/>
+            <a:ext cx="2395207" cy="369332"/>
+          </a:xfrm>
+          <a:prstGeom prst="rect">
+            <a:avLst/>
+          </a:prstGeom>
+          <a:noFill/>
+        </p:spPr>
+        <p:txBody>
+          <a:bodyPr wrap="none" rtlCol="0">
+            <a:spAutoFit/>
+          </a:bodyPr>
+          <a:lstStyle/>
+          <a:p>
+            <a:r>
+              <a:rPr lang="en-US" dirty="0"/>
+              <a:t>Basis set of size (3, 2, 2)</a:t>
+            </a:r>
+          </a:p>
+        </p:txBody>
+      </p:sp>
+    </p:spTree>
+    <p:extLst>
+      <p:ext uri="{BB962C8B-B14F-4D97-AF65-F5344CB8AC3E}">
+        <p14:creationId xmlns:p14="http://schemas.microsoft.com/office/powerpoint/2010/main" val="2958444158"/>
+      </p:ext>
+    </p:extLst>
+  </p:cSld>
+  <p:clrMapOvr>
+    <a:masterClrMapping/>
+  </p:clrMapOvr>
+</p:sld>
+</file>
+
+<file path=ppt/slides/slide15.xml><?xml version="1.0" encoding="utf-8"?>
+<p:sld xmlns:a="http://schemas.openxmlformats.org/drawingml/2006/main" xmlns:r="http://schemas.openxmlformats.org/officeDocument/2006/relationships" xmlns:p="http://schemas.openxmlformats.org/presentationml/2006/main">
+  <p:cSld>
+    <p:spTree>
+      <p:nvGrpSpPr>
+        <p:cNvPr id="1" name=""/>
+        <p:cNvGrpSpPr/>
+        <p:nvPr/>
+      </p:nvGrpSpPr>
+      <p:grpSpPr>
+        <a:xfrm>
+          <a:off x="0" y="0"/>
+          <a:ext cx="0" cy="0"/>
+          <a:chOff x="0" y="0"/>
+          <a:chExt cx="0" cy="0"/>
+        </a:xfrm>
+      </p:grpSpPr>
+      <p:sp>
+        <p:nvSpPr>
+          <p:cNvPr id="2" name="Title 1">
+            <a:extLst>
+              <a:ext uri="{FF2B5EF4-FFF2-40B4-BE49-F238E27FC236}">
+                <a16:creationId xmlns:a16="http://schemas.microsoft.com/office/drawing/2014/main" id="{AF2B90A3-32E3-FE4D-9032-EB84B82D8BE9}"/>
+              </a:ext>
+            </a:extLst>
+          </p:cNvPr>
+          <p:cNvSpPr>
+            <a:spLocks noGrp="1"/>
+          </p:cNvSpPr>
+          <p:nvPr>
+            <p:ph type="title"/>
+          </p:nvPr>
+        </p:nvSpPr>
+        <p:spPr/>
+        <p:txBody>
+          <a:bodyPr/>
+          <a:lstStyle/>
+          <a:p>
+            <a:r>
+              <a:rPr lang="en-US" dirty="0"/>
+              <a:t>Mapping Thread</a:t>
+            </a:r>
+          </a:p>
+        </p:txBody>
+      </p:sp>
+      <p:sp>
+        <p:nvSpPr>
+          <p:cNvPr id="4" name="Slide Number Placeholder 3">
+            <a:extLst>
+              <a:ext uri="{FF2B5EF4-FFF2-40B4-BE49-F238E27FC236}">
+                <a16:creationId xmlns:a16="http://schemas.microsoft.com/office/drawing/2014/main" id="{FF145605-CDA4-B443-8F8A-2DEC00EA4841}"/>
+              </a:ext>
+            </a:extLst>
+          </p:cNvPr>
+          <p:cNvSpPr>
+            <a:spLocks noGrp="1"/>
+          </p:cNvSpPr>
+          <p:nvPr>
+            <p:ph type="sldNum" sz="quarter" idx="12"/>
+          </p:nvPr>
+        </p:nvSpPr>
+        <p:spPr/>
+        <p:txBody>
+          <a:bodyPr/>
+          <a:lstStyle/>
+          <a:p>
+            <a:fld id="{2CC1335D-5C6A-0B42-9745-CD5AAF743FE7}" type="slidenum">
+              <a:rPr lang="en-US" smtClean="0"/>
+              <a:t>15</a:t>
+            </a:fld>
+            <a:endParaRPr lang="en-US"/>
+          </a:p>
+        </p:txBody>
+      </p:sp>
+    </p:spTree>
+    <p:extLst>
+      <p:ext uri="{BB962C8B-B14F-4D97-AF65-F5344CB8AC3E}">
+        <p14:creationId xmlns:p14="http://schemas.microsoft.com/office/powerpoint/2010/main" val="553132463"/>
+      </p:ext>
+    </p:extLst>
+  </p:cSld>
+  <p:clrMapOvr>
+    <a:masterClrMapping/>
+  </p:clrMapOvr>
 </p:sld>
 </file>
 
@@ -3521,10 +4659,1516 @@
           <a:lstStyle/>
           <a:p>
             <a:r>
-              <a:rPr lang="en-US" dirty="0" smtClean="0"/>
+              <a:rPr lang="en-US" dirty="0"/>
+              <a:t>Dirac Equation</a:t>
+            </a:r>
+          </a:p>
+        </p:txBody>
+      </p:sp>
+      <p:sp>
+        <p:nvSpPr>
+          <p:cNvPr id="3" name="Content Placeholder 2"/>
+          <p:cNvSpPr>
+            <a:spLocks noGrp="1"/>
+          </p:cNvSpPr>
+          <p:nvPr>
+            <p:ph idx="1"/>
+          </p:nvPr>
+        </p:nvSpPr>
+        <p:spPr/>
+        <p:txBody>
+          <a:bodyPr/>
+          <a:lstStyle/>
+          <a:p>
+            <a:r>
+              <a:rPr lang="en-US" dirty="0"/>
+              <a:t>First accurate merging of quantum mechanics and special relativity was done by Dirac</a:t>
+            </a:r>
+          </a:p>
+          <a:p>
+            <a:r>
+              <a:rPr lang="en-US" dirty="0"/>
+              <a:t>Gave an equation for a free electron</a:t>
+            </a:r>
+          </a:p>
+        </p:txBody>
+      </p:sp>
+      <p:pic>
+        <p:nvPicPr>
+          <p:cNvPr id="5" name="Picture 4" descr="latex-image-1.pdf"/>
+          <p:cNvPicPr>
+            <a:picLocks noChangeAspect="1"/>
+          </p:cNvPicPr>
+          <p:nvPr/>
+        </p:nvPicPr>
+        <p:blipFill>
+          <a:blip r:embed="rId2">
+            <a:extLst>
+              <a:ext uri="{28A0092B-C50C-407E-A947-70E740481C1C}">
+                <a14:useLocalDpi xmlns:a14="http://schemas.microsoft.com/office/drawing/2010/main" val="0"/>
+              </a:ext>
+            </a:extLst>
+          </a:blip>
+          <a:stretch>
+            <a:fillRect/>
+          </a:stretch>
+        </p:blipFill>
+        <p:spPr>
+          <a:xfrm>
+            <a:off x="1981200" y="4377592"/>
+            <a:ext cx="3987800" cy="787400"/>
+          </a:xfrm>
+          <a:prstGeom prst="rect">
+            <a:avLst/>
+          </a:prstGeom>
+        </p:spPr>
+      </p:pic>
+      <p:pic>
+        <p:nvPicPr>
+          <p:cNvPr id="6" name="Picture 5" descr="latex-image-1.pdf"/>
+          <p:cNvPicPr>
+            <a:picLocks noChangeAspect="1"/>
+          </p:cNvPicPr>
+          <p:nvPr/>
+        </p:nvPicPr>
+        <p:blipFill>
+          <a:blip r:embed="rId3">
+            <a:extLst>
+              <a:ext uri="{28A0092B-C50C-407E-A947-70E740481C1C}">
+                <a14:useLocalDpi xmlns:a14="http://schemas.microsoft.com/office/drawing/2010/main" val="0"/>
+              </a:ext>
+            </a:extLst>
+          </a:blip>
+          <a:stretch>
+            <a:fillRect/>
+          </a:stretch>
+        </p:blipFill>
+        <p:spPr>
+          <a:xfrm>
+            <a:off x="1981200" y="3139342"/>
+            <a:ext cx="3987800" cy="787400"/>
+          </a:xfrm>
+          <a:prstGeom prst="rect">
+            <a:avLst/>
+          </a:prstGeom>
+        </p:spPr>
+      </p:pic>
+      <p:pic>
+        <p:nvPicPr>
+          <p:cNvPr id="8" name="Picture 7" descr="latex-image-1.pdf"/>
+          <p:cNvPicPr>
+            <a:picLocks noChangeAspect="1"/>
+          </p:cNvPicPr>
+          <p:nvPr/>
+        </p:nvPicPr>
+        <p:blipFill>
+          <a:blip r:embed="rId4">
+            <a:extLst>
+              <a:ext uri="{28A0092B-C50C-407E-A947-70E740481C1C}">
+                <a14:useLocalDpi xmlns:a14="http://schemas.microsoft.com/office/drawing/2010/main" val="0"/>
+              </a:ext>
+            </a:extLst>
+          </a:blip>
+          <a:stretch>
+            <a:fillRect/>
+          </a:stretch>
+        </p:blipFill>
+        <p:spPr>
+          <a:xfrm>
+            <a:off x="6580717" y="4424561"/>
+            <a:ext cx="1663700" cy="622300"/>
+          </a:xfrm>
+          <a:prstGeom prst="rect">
+            <a:avLst/>
+          </a:prstGeom>
+        </p:spPr>
+      </p:pic>
+      <p:pic>
+        <p:nvPicPr>
+          <p:cNvPr id="10" name="Picture 9" descr="latex-image-1.pdf"/>
+          <p:cNvPicPr>
+            <a:picLocks noChangeAspect="1"/>
+          </p:cNvPicPr>
+          <p:nvPr/>
+        </p:nvPicPr>
+        <p:blipFill>
+          <a:blip r:embed="rId5">
+            <a:extLst>
+              <a:ext uri="{28A0092B-C50C-407E-A947-70E740481C1C}">
+                <a14:useLocalDpi xmlns:a14="http://schemas.microsoft.com/office/drawing/2010/main" val="0"/>
+              </a:ext>
+            </a:extLst>
+          </a:blip>
+          <a:stretch>
+            <a:fillRect/>
+          </a:stretch>
+        </p:blipFill>
+        <p:spPr>
+          <a:xfrm>
+            <a:off x="6580717" y="3192660"/>
+            <a:ext cx="1765300" cy="622300"/>
+          </a:xfrm>
+          <a:prstGeom prst="rect">
+            <a:avLst/>
+          </a:prstGeom>
+        </p:spPr>
+      </p:pic>
+      <p:pic>
+        <p:nvPicPr>
+          <p:cNvPr id="11" name="Picture 10" descr="latex-image-1.pdf"/>
+          <p:cNvPicPr>
+            <a:picLocks noChangeAspect="1"/>
+          </p:cNvPicPr>
+          <p:nvPr/>
+        </p:nvPicPr>
+        <p:blipFill>
+          <a:blip r:embed="rId6">
+            <a:extLst>
+              <a:ext uri="{28A0092B-C50C-407E-A947-70E740481C1C}">
+                <a14:useLocalDpi xmlns:a14="http://schemas.microsoft.com/office/drawing/2010/main" val="0"/>
+              </a:ext>
+            </a:extLst>
+          </a:blip>
+          <a:stretch>
+            <a:fillRect/>
+          </a:stretch>
+        </p:blipFill>
+        <p:spPr>
+          <a:xfrm>
+            <a:off x="2062098" y="5428714"/>
+            <a:ext cx="1435100" cy="622300"/>
+          </a:xfrm>
+          <a:prstGeom prst="rect">
+            <a:avLst/>
+          </a:prstGeom>
+        </p:spPr>
+      </p:pic>
+      <p:pic>
+        <p:nvPicPr>
+          <p:cNvPr id="13" name="Picture 12" descr="latex-image-1.pdf"/>
+          <p:cNvPicPr>
+            <a:picLocks noChangeAspect="1"/>
+          </p:cNvPicPr>
+          <p:nvPr/>
+        </p:nvPicPr>
+        <p:blipFill>
+          <a:blip r:embed="rId7">
+            <a:extLst>
+              <a:ext uri="{28A0092B-C50C-407E-A947-70E740481C1C}">
+                <a14:useLocalDpi xmlns:a14="http://schemas.microsoft.com/office/drawing/2010/main" val="0"/>
+              </a:ext>
+            </a:extLst>
+          </a:blip>
+          <a:stretch>
+            <a:fillRect/>
+          </a:stretch>
+        </p:blipFill>
+        <p:spPr>
+          <a:xfrm>
+            <a:off x="3882429" y="5428714"/>
+            <a:ext cx="1587500" cy="622300"/>
+          </a:xfrm>
+          <a:prstGeom prst="rect">
+            <a:avLst/>
+          </a:prstGeom>
+        </p:spPr>
+      </p:pic>
+      <p:pic>
+        <p:nvPicPr>
+          <p:cNvPr id="14" name="Picture 13" descr="latex-image-1.pdf"/>
+          <p:cNvPicPr>
+            <a:picLocks noChangeAspect="1"/>
+          </p:cNvPicPr>
+          <p:nvPr/>
+        </p:nvPicPr>
+        <p:blipFill>
+          <a:blip r:embed="rId8">
+            <a:extLst>
+              <a:ext uri="{28A0092B-C50C-407E-A947-70E740481C1C}">
+                <a14:useLocalDpi xmlns:a14="http://schemas.microsoft.com/office/drawing/2010/main" val="0"/>
+              </a:ext>
+            </a:extLst>
+          </a:blip>
+          <a:stretch>
+            <a:fillRect/>
+          </a:stretch>
+        </p:blipFill>
+        <p:spPr>
+          <a:xfrm>
+            <a:off x="5912313" y="5428714"/>
+            <a:ext cx="1612900" cy="622300"/>
+          </a:xfrm>
+          <a:prstGeom prst="rect">
+            <a:avLst/>
+          </a:prstGeom>
+        </p:spPr>
+      </p:pic>
+      <p:sp>
+        <p:nvSpPr>
+          <p:cNvPr id="17" name="Slide Number Placeholder 16"/>
+          <p:cNvSpPr>
+            <a:spLocks noGrp="1"/>
+          </p:cNvSpPr>
+          <p:nvPr>
+            <p:ph type="sldNum" sz="quarter" idx="12"/>
+          </p:nvPr>
+        </p:nvSpPr>
+        <p:spPr/>
+        <p:txBody>
+          <a:bodyPr/>
+          <a:lstStyle/>
+          <a:p>
+            <a:fld id="{38237106-F2ED-405E-BC33-CC3CF426205F}" type="slidenum">
+              <a:rPr lang="en-US" smtClean="0"/>
+              <a:pPr/>
+              <a:t>2</a:t>
+            </a:fld>
+            <a:endParaRPr lang="en-US" dirty="0"/>
+          </a:p>
+        </p:txBody>
+      </p:sp>
+      <p:sp>
+        <p:nvSpPr>
+          <p:cNvPr id="18" name="Content Placeholder 2"/>
+          <p:cNvSpPr txBox="1">
+            <a:spLocks/>
+          </p:cNvSpPr>
+          <p:nvPr/>
+        </p:nvSpPr>
+        <p:spPr>
+          <a:xfrm>
+            <a:off x="6230241" y="3270742"/>
+            <a:ext cx="4231552" cy="1900763"/>
+          </a:xfrm>
+          <a:prstGeom prst="rect">
+            <a:avLst/>
+          </a:prstGeom>
+        </p:spPr>
+        <p:txBody>
+          <a:bodyPr vert="horz" lIns="91440" tIns="45720" rIns="91440" bIns="45720" rtlCol="0">
+            <a:normAutofit lnSpcReduction="10000"/>
+          </a:bodyPr>
+          <a:lstStyle>
+            <a:lvl1pPr marL="342900" indent="-342900" algn="l" defTabSz="914400" rtl="0" eaLnBrk="1" latinLnBrk="0" hangingPunct="1">
+              <a:spcBef>
+                <a:spcPct val="20000"/>
+              </a:spcBef>
+              <a:buFont typeface="Arial" pitchFamily="34" charset="0"/>
+              <a:buChar char="•"/>
+              <a:defRPr sz="2400" kern="1200">
+                <a:solidFill>
+                  <a:schemeClr val="tx1">
+                    <a:lumMod val="50000"/>
+                    <a:lumOff val="50000"/>
+                  </a:schemeClr>
+                </a:solidFill>
+                <a:latin typeface="+mj-lt"/>
+                <a:ea typeface="+mn-ea"/>
+                <a:cs typeface="+mn-cs"/>
+              </a:defRPr>
+            </a:lvl1pPr>
+            <a:lvl2pPr marL="742950" indent="-285750" algn="l" defTabSz="914400" rtl="0" eaLnBrk="1" latinLnBrk="0" hangingPunct="1">
+              <a:spcBef>
+                <a:spcPct val="20000"/>
+              </a:spcBef>
+              <a:buFont typeface="Courier New" pitchFamily="49" charset="0"/>
+              <a:buChar char="o"/>
+              <a:defRPr sz="1600" kern="1200">
+                <a:solidFill>
+                  <a:schemeClr val="tx1">
+                    <a:lumMod val="50000"/>
+                    <a:lumOff val="50000"/>
+                  </a:schemeClr>
+                </a:solidFill>
+                <a:latin typeface="+mj-lt"/>
+                <a:ea typeface="+mn-ea"/>
+                <a:cs typeface="+mn-cs"/>
+              </a:defRPr>
+            </a:lvl2pPr>
+            <a:lvl3pPr marL="1143000" indent="-228600" algn="l" defTabSz="914400" rtl="0" eaLnBrk="1" latinLnBrk="0" hangingPunct="1">
+              <a:spcBef>
+                <a:spcPct val="20000"/>
+              </a:spcBef>
+              <a:buFont typeface="Arial" pitchFamily="34" charset="0"/>
+              <a:buChar char="•"/>
+              <a:defRPr sz="1600" kern="1200">
+                <a:solidFill>
+                  <a:schemeClr val="tx1">
+                    <a:lumMod val="50000"/>
+                    <a:lumOff val="50000"/>
+                  </a:schemeClr>
+                </a:solidFill>
+                <a:latin typeface="+mj-lt"/>
+                <a:ea typeface="+mn-ea"/>
+                <a:cs typeface="+mn-cs"/>
+              </a:defRPr>
+            </a:lvl3pPr>
+            <a:lvl4pPr marL="1600200" indent="-228600" algn="l" defTabSz="914400" rtl="0" eaLnBrk="1" latinLnBrk="0" hangingPunct="1">
+              <a:spcBef>
+                <a:spcPct val="20000"/>
+              </a:spcBef>
+              <a:buFont typeface="Courier New" pitchFamily="49" charset="0"/>
+              <a:buChar char="o"/>
+              <a:defRPr sz="1600" kern="1200">
+                <a:solidFill>
+                  <a:schemeClr val="tx1">
+                    <a:lumMod val="50000"/>
+                    <a:lumOff val="50000"/>
+                  </a:schemeClr>
+                </a:solidFill>
+                <a:latin typeface="+mj-lt"/>
+                <a:ea typeface="+mn-ea"/>
+                <a:cs typeface="+mn-cs"/>
+              </a:defRPr>
+            </a:lvl4pPr>
+            <a:lvl5pPr marL="2057400" indent="-228600" algn="l" defTabSz="914400" rtl="0" eaLnBrk="1" latinLnBrk="0" hangingPunct="1">
+              <a:spcBef>
+                <a:spcPct val="20000"/>
+              </a:spcBef>
+              <a:buFont typeface="Arial" pitchFamily="34" charset="0"/>
+              <a:buChar char="•"/>
+              <a:defRPr sz="1600" kern="1200">
+                <a:solidFill>
+                  <a:schemeClr val="tx1">
+                    <a:lumMod val="50000"/>
+                    <a:lumOff val="50000"/>
+                  </a:schemeClr>
+                </a:solidFill>
+                <a:latin typeface="+mj-lt"/>
+                <a:ea typeface="+mn-ea"/>
+                <a:cs typeface="+mn-cs"/>
+              </a:defRPr>
+            </a:lvl5pPr>
+            <a:lvl6pPr marL="2514600" indent="-228600" algn="l" defTabSz="914400" rtl="0" eaLnBrk="1" latinLnBrk="0" hangingPunct="1">
+              <a:spcBef>
+                <a:spcPct val="20000"/>
+              </a:spcBef>
+              <a:buFont typeface="Courier New" pitchFamily="49" charset="0"/>
+              <a:buChar char="o"/>
+              <a:defRPr sz="1600" kern="1200">
+                <a:solidFill>
+                  <a:schemeClr val="tx1">
+                    <a:lumMod val="50000"/>
+                    <a:lumOff val="50000"/>
+                  </a:schemeClr>
+                </a:solidFill>
+                <a:latin typeface="+mj-lt"/>
+                <a:ea typeface="+mn-ea"/>
+                <a:cs typeface="+mn-cs"/>
+              </a:defRPr>
+            </a:lvl6pPr>
+            <a:lvl7pPr marL="2971800" indent="-228600" algn="l" defTabSz="914400" rtl="0" eaLnBrk="1" latinLnBrk="0" hangingPunct="1">
+              <a:spcBef>
+                <a:spcPct val="20000"/>
+              </a:spcBef>
+              <a:buFont typeface="Arial" pitchFamily="34" charset="0"/>
+              <a:buChar char="•"/>
+              <a:defRPr sz="1600" kern="1200">
+                <a:solidFill>
+                  <a:schemeClr val="tx1">
+                    <a:lumMod val="50000"/>
+                    <a:lumOff val="50000"/>
+                  </a:schemeClr>
+                </a:solidFill>
+                <a:latin typeface="+mj-lt"/>
+                <a:ea typeface="+mn-ea"/>
+                <a:cs typeface="+mn-cs"/>
+              </a:defRPr>
+            </a:lvl7pPr>
+            <a:lvl8pPr marL="3429000" indent="-228600" algn="l" defTabSz="914400" rtl="0" eaLnBrk="1" latinLnBrk="0" hangingPunct="1">
+              <a:spcBef>
+                <a:spcPct val="20000"/>
+              </a:spcBef>
+              <a:buFont typeface="Courier New" pitchFamily="49" charset="0"/>
+              <a:buChar char="o"/>
+              <a:defRPr sz="1600" kern="1200">
+                <a:solidFill>
+                  <a:schemeClr val="tx1">
+                    <a:lumMod val="50000"/>
+                    <a:lumOff val="50000"/>
+                  </a:schemeClr>
+                </a:solidFill>
+                <a:latin typeface="+mj-lt"/>
+                <a:ea typeface="+mn-ea"/>
+                <a:cs typeface="+mn-cs"/>
+              </a:defRPr>
+            </a:lvl8pPr>
+            <a:lvl9pPr marL="3886200" indent="-228600" algn="l" defTabSz="914400" rtl="0" eaLnBrk="1" latinLnBrk="0" hangingPunct="1">
+              <a:spcBef>
+                <a:spcPct val="20000"/>
+              </a:spcBef>
+              <a:buFont typeface="Arial" pitchFamily="34" charset="0"/>
+              <a:buChar char="•"/>
+              <a:defRPr sz="1600" kern="1200">
+                <a:solidFill>
+                  <a:schemeClr val="tx1">
+                    <a:lumMod val="50000"/>
+                    <a:lumOff val="50000"/>
+                  </a:schemeClr>
+                </a:solidFill>
+                <a:latin typeface="+mj-lt"/>
+                <a:ea typeface="+mn-ea"/>
+                <a:cs typeface="+mn-cs"/>
+              </a:defRPr>
+            </a:lvl9pPr>
+          </a:lstStyle>
+          <a:p>
+            <a:pPr marL="0" indent="0">
+              <a:buNone/>
+            </a:pPr>
+            <a:r>
+              <a:rPr lang="en-US" dirty="0">
+                <a:solidFill>
+                  <a:schemeClr val="tx1"/>
+                </a:solidFill>
+                <a:latin typeface="+mn-lt"/>
+              </a:rPr>
+              <a:t>Negative energy electrons (positrons)</a:t>
+            </a:r>
+          </a:p>
+          <a:p>
+            <a:pPr marL="0" indent="0">
+              <a:buNone/>
+            </a:pPr>
+            <a:endParaRPr lang="en-US" dirty="0">
+              <a:solidFill>
+                <a:schemeClr val="tx1"/>
+              </a:solidFill>
+              <a:latin typeface="+mn-lt"/>
+            </a:endParaRPr>
+          </a:p>
+          <a:p>
+            <a:pPr marL="0" indent="0">
+              <a:buNone/>
+            </a:pPr>
+            <a:r>
+              <a:rPr lang="en-US" dirty="0">
+                <a:solidFill>
+                  <a:schemeClr val="tx1"/>
+                </a:solidFill>
+                <a:latin typeface="+mn-lt"/>
+              </a:rPr>
+              <a:t>Positive energy electrons (electrons)</a:t>
+            </a:r>
+          </a:p>
+          <a:p>
+            <a:pPr marL="0" indent="0">
+              <a:buNone/>
+            </a:pPr>
+            <a:endParaRPr lang="en-US" dirty="0">
+              <a:solidFill>
+                <a:schemeClr val="tx1"/>
+              </a:solidFill>
+              <a:latin typeface="+mn-lt"/>
+            </a:endParaRPr>
+          </a:p>
+        </p:txBody>
+      </p:sp>
+      <p:pic>
+        <p:nvPicPr>
+          <p:cNvPr id="19" name="Picture 18" descr="latex-image-1.pdf"/>
+          <p:cNvPicPr>
+            <a:picLocks noChangeAspect="1"/>
+          </p:cNvPicPr>
+          <p:nvPr/>
+        </p:nvPicPr>
+        <p:blipFill>
+          <a:blip r:embed="rId9">
+            <a:extLst>
+              <a:ext uri="{28A0092B-C50C-407E-A947-70E740481C1C}">
+                <a14:useLocalDpi xmlns:a14="http://schemas.microsoft.com/office/drawing/2010/main" val="0"/>
+              </a:ext>
+            </a:extLst>
+          </a:blip>
+          <a:stretch>
+            <a:fillRect/>
+          </a:stretch>
+        </p:blipFill>
+        <p:spPr>
+          <a:xfrm>
+            <a:off x="7870993" y="5124450"/>
+            <a:ext cx="2590800" cy="1231900"/>
+          </a:xfrm>
+          <a:prstGeom prst="rect">
+            <a:avLst/>
+          </a:prstGeom>
+        </p:spPr>
+      </p:pic>
+      <p:pic>
+        <p:nvPicPr>
+          <p:cNvPr id="15" name="Picture 14" descr="latex-image-1.pdf"/>
+          <p:cNvPicPr>
+            <a:picLocks noChangeAspect="1"/>
+          </p:cNvPicPr>
+          <p:nvPr/>
+        </p:nvPicPr>
+        <p:blipFill>
+          <a:blip r:embed="rId10">
+            <a:extLst>
+              <a:ext uri="{28A0092B-C50C-407E-A947-70E740481C1C}">
+                <a14:useLocalDpi xmlns:a14="http://schemas.microsoft.com/office/drawing/2010/main" val="0"/>
+              </a:ext>
+            </a:extLst>
+          </a:blip>
+          <a:stretch>
+            <a:fillRect/>
+          </a:stretch>
+        </p:blipFill>
+        <p:spPr>
+          <a:xfrm>
+            <a:off x="8616950" y="3555426"/>
+            <a:ext cx="1181100" cy="1231900"/>
+          </a:xfrm>
+          <a:prstGeom prst="rect">
+            <a:avLst/>
+          </a:prstGeom>
+        </p:spPr>
+      </p:pic>
+    </p:spTree>
+    <p:extLst>
+      <p:ext uri="{BB962C8B-B14F-4D97-AF65-F5344CB8AC3E}">
+        <p14:creationId xmlns:p14="http://schemas.microsoft.com/office/powerpoint/2010/main" val="3902983867"/>
+      </p:ext>
+    </p:extLst>
+  </p:cSld>
+  <p:clrMapOvr>
+    <a:masterClrMapping/>
+  </p:clrMapOvr>
+  <p:timing>
+    <p:tnLst>
+      <p:par>
+        <p:cTn id="1" dur="indefinite" restart="never" nodeType="tmRoot">
+          <p:childTnLst>
+            <p:seq concurrent="1" nextAc="seek">
+              <p:cTn id="2" dur="indefinite" nodeType="mainSeq">
+                <p:childTnLst>
+                  <p:par>
+                    <p:cTn id="3" fill="hold">
+                      <p:stCondLst>
+                        <p:cond delay="indefinite"/>
+                      </p:stCondLst>
+                      <p:childTnLst>
+                        <p:par>
+                          <p:cTn id="4" fill="hold">
+                            <p:stCondLst>
+                              <p:cond delay="0"/>
+                            </p:stCondLst>
+                            <p:childTnLst>
+                              <p:par>
+                                <p:cTn id="5" presetID="1" presetClass="entr" presetSubtype="0" fill="hold" nodeType="clickEffect">
+                                  <p:stCondLst>
+                                    <p:cond delay="0"/>
+                                  </p:stCondLst>
+                                  <p:childTnLst>
+                                    <p:set>
+                                      <p:cBhvr>
+                                        <p:cTn id="6" dur="1" fill="hold">
+                                          <p:stCondLst>
+                                            <p:cond delay="0"/>
+                                          </p:stCondLst>
+                                        </p:cTn>
+                                        <p:tgtEl>
+                                          <p:spTgt spid="6"/>
+                                        </p:tgtEl>
+                                        <p:attrNameLst>
+                                          <p:attrName>style.visibility</p:attrName>
+                                        </p:attrNameLst>
+                                      </p:cBhvr>
+                                      <p:to>
+                                        <p:strVal val="visible"/>
+                                      </p:to>
+                                    </p:set>
+                                  </p:childTnLst>
+                                </p:cTn>
+                              </p:par>
+                              <p:par>
+                                <p:cTn id="7" presetID="1" presetClass="entr" presetSubtype="0" fill="hold" nodeType="withEffect">
+                                  <p:stCondLst>
+                                    <p:cond delay="0"/>
+                                  </p:stCondLst>
+                                  <p:childTnLst>
+                                    <p:set>
+                                      <p:cBhvr>
+                                        <p:cTn id="8" dur="1" fill="hold">
+                                          <p:stCondLst>
+                                            <p:cond delay="0"/>
+                                          </p:stCondLst>
+                                        </p:cTn>
+                                        <p:tgtEl>
+                                          <p:spTgt spid="5"/>
+                                        </p:tgtEl>
+                                        <p:attrNameLst>
+                                          <p:attrName>style.visibility</p:attrName>
+                                        </p:attrNameLst>
+                                      </p:cBhvr>
+                                      <p:to>
+                                        <p:strVal val="visible"/>
+                                      </p:to>
+                                    </p:set>
+                                  </p:childTnLst>
+                                </p:cTn>
+                              </p:par>
+                            </p:childTnLst>
+                          </p:cTn>
+                        </p:par>
+                      </p:childTnLst>
+                    </p:cTn>
+                  </p:par>
+                  <p:par>
+                    <p:cTn id="9" fill="hold">
+                      <p:stCondLst>
+                        <p:cond delay="indefinite"/>
+                      </p:stCondLst>
+                      <p:childTnLst>
+                        <p:par>
+                          <p:cTn id="10" fill="hold">
+                            <p:stCondLst>
+                              <p:cond delay="0"/>
+                            </p:stCondLst>
+                            <p:childTnLst>
+                              <p:par>
+                                <p:cTn id="11" presetID="1" presetClass="entr" presetSubtype="0" fill="hold" grpId="0" nodeType="clickEffect">
+                                  <p:stCondLst>
+                                    <p:cond delay="0"/>
+                                  </p:stCondLst>
+                                  <p:childTnLst>
+                                    <p:set>
+                                      <p:cBhvr>
+                                        <p:cTn id="12" dur="1" fill="hold">
+                                          <p:stCondLst>
+                                            <p:cond delay="0"/>
+                                          </p:stCondLst>
+                                        </p:cTn>
+                                        <p:tgtEl>
+                                          <p:spTgt spid="18"/>
+                                        </p:tgtEl>
+                                        <p:attrNameLst>
+                                          <p:attrName>style.visibility</p:attrName>
+                                        </p:attrNameLst>
+                                      </p:cBhvr>
+                                      <p:to>
+                                        <p:strVal val="visible"/>
+                                      </p:to>
+                                    </p:set>
+                                  </p:childTnLst>
+                                </p:cTn>
+                              </p:par>
+                            </p:childTnLst>
+                          </p:cTn>
+                        </p:par>
+                      </p:childTnLst>
+                    </p:cTn>
+                  </p:par>
+                  <p:par>
+                    <p:cTn id="13" fill="hold">
+                      <p:stCondLst>
+                        <p:cond delay="indefinite"/>
+                      </p:stCondLst>
+                      <p:childTnLst>
+                        <p:par>
+                          <p:cTn id="14" fill="hold">
+                            <p:stCondLst>
+                              <p:cond delay="0"/>
+                            </p:stCondLst>
+                            <p:childTnLst>
+                              <p:par>
+                                <p:cTn id="15" presetID="1" presetClass="exit" presetSubtype="0" fill="hold" grpId="1" nodeType="clickEffect">
+                                  <p:stCondLst>
+                                    <p:cond delay="0"/>
+                                  </p:stCondLst>
+                                  <p:childTnLst>
+                                    <p:set>
+                                      <p:cBhvr>
+                                        <p:cTn id="16" dur="1" fill="hold">
+                                          <p:stCondLst>
+                                            <p:cond delay="0"/>
+                                          </p:stCondLst>
+                                        </p:cTn>
+                                        <p:tgtEl>
+                                          <p:spTgt spid="18"/>
+                                        </p:tgtEl>
+                                        <p:attrNameLst>
+                                          <p:attrName>style.visibility</p:attrName>
+                                        </p:attrNameLst>
+                                      </p:cBhvr>
+                                      <p:to>
+                                        <p:strVal val="hidden"/>
+                                      </p:to>
+                                    </p:set>
+                                  </p:childTnLst>
+                                </p:cTn>
+                              </p:par>
+                            </p:childTnLst>
+                          </p:cTn>
+                        </p:par>
+                        <p:par>
+                          <p:cTn id="17" fill="hold">
+                            <p:stCondLst>
+                              <p:cond delay="0"/>
+                            </p:stCondLst>
+                            <p:childTnLst>
+                              <p:par>
+                                <p:cTn id="18" presetID="1" presetClass="entr" presetSubtype="0" fill="hold" nodeType="afterEffect">
+                                  <p:stCondLst>
+                                    <p:cond delay="0"/>
+                                  </p:stCondLst>
+                                  <p:childTnLst>
+                                    <p:set>
+                                      <p:cBhvr>
+                                        <p:cTn id="19" dur="1" fill="hold">
+                                          <p:stCondLst>
+                                            <p:cond delay="0"/>
+                                          </p:stCondLst>
+                                        </p:cTn>
+                                        <p:tgtEl>
+                                          <p:spTgt spid="10"/>
+                                        </p:tgtEl>
+                                        <p:attrNameLst>
+                                          <p:attrName>style.visibility</p:attrName>
+                                        </p:attrNameLst>
+                                      </p:cBhvr>
+                                      <p:to>
+                                        <p:strVal val="visible"/>
+                                      </p:to>
+                                    </p:set>
+                                  </p:childTnLst>
+                                </p:cTn>
+                              </p:par>
+                              <p:par>
+                                <p:cTn id="20" presetID="1" presetClass="entr" presetSubtype="0" fill="hold" nodeType="withEffect">
+                                  <p:stCondLst>
+                                    <p:cond delay="0"/>
+                                  </p:stCondLst>
+                                  <p:childTnLst>
+                                    <p:set>
+                                      <p:cBhvr>
+                                        <p:cTn id="21" dur="1" fill="hold">
+                                          <p:stCondLst>
+                                            <p:cond delay="0"/>
+                                          </p:stCondLst>
+                                        </p:cTn>
+                                        <p:tgtEl>
+                                          <p:spTgt spid="8"/>
+                                        </p:tgtEl>
+                                        <p:attrNameLst>
+                                          <p:attrName>style.visibility</p:attrName>
+                                        </p:attrNameLst>
+                                      </p:cBhvr>
+                                      <p:to>
+                                        <p:strVal val="visible"/>
+                                      </p:to>
+                                    </p:set>
+                                  </p:childTnLst>
+                                </p:cTn>
+                              </p:par>
+                            </p:childTnLst>
+                          </p:cTn>
+                        </p:par>
+                      </p:childTnLst>
+                    </p:cTn>
+                  </p:par>
+                  <p:par>
+                    <p:cTn id="22" fill="hold">
+                      <p:stCondLst>
+                        <p:cond delay="indefinite"/>
+                      </p:stCondLst>
+                      <p:childTnLst>
+                        <p:par>
+                          <p:cTn id="23" fill="hold">
+                            <p:stCondLst>
+                              <p:cond delay="0"/>
+                            </p:stCondLst>
+                            <p:childTnLst>
+                              <p:par>
+                                <p:cTn id="24" presetID="1" presetClass="entr" presetSubtype="0" fill="hold" nodeType="clickEffect">
+                                  <p:stCondLst>
+                                    <p:cond delay="0"/>
+                                  </p:stCondLst>
+                                  <p:childTnLst>
+                                    <p:set>
+                                      <p:cBhvr>
+                                        <p:cTn id="25" dur="1" fill="hold">
+                                          <p:stCondLst>
+                                            <p:cond delay="0"/>
+                                          </p:stCondLst>
+                                        </p:cTn>
+                                        <p:tgtEl>
+                                          <p:spTgt spid="11"/>
+                                        </p:tgtEl>
+                                        <p:attrNameLst>
+                                          <p:attrName>style.visibility</p:attrName>
+                                        </p:attrNameLst>
+                                      </p:cBhvr>
+                                      <p:to>
+                                        <p:strVal val="visible"/>
+                                      </p:to>
+                                    </p:set>
+                                  </p:childTnLst>
+                                </p:cTn>
+                              </p:par>
+                              <p:par>
+                                <p:cTn id="26" presetID="1" presetClass="entr" presetSubtype="0" fill="hold" nodeType="withEffect">
+                                  <p:stCondLst>
+                                    <p:cond delay="0"/>
+                                  </p:stCondLst>
+                                  <p:childTnLst>
+                                    <p:set>
+                                      <p:cBhvr>
+                                        <p:cTn id="27" dur="1" fill="hold">
+                                          <p:stCondLst>
+                                            <p:cond delay="0"/>
+                                          </p:stCondLst>
+                                        </p:cTn>
+                                        <p:tgtEl>
+                                          <p:spTgt spid="13"/>
+                                        </p:tgtEl>
+                                        <p:attrNameLst>
+                                          <p:attrName>style.visibility</p:attrName>
+                                        </p:attrNameLst>
+                                      </p:cBhvr>
+                                      <p:to>
+                                        <p:strVal val="visible"/>
+                                      </p:to>
+                                    </p:set>
+                                  </p:childTnLst>
+                                </p:cTn>
+                              </p:par>
+                              <p:par>
+                                <p:cTn id="28" presetID="1" presetClass="entr" presetSubtype="0" fill="hold" nodeType="withEffect">
+                                  <p:stCondLst>
+                                    <p:cond delay="0"/>
+                                  </p:stCondLst>
+                                  <p:childTnLst>
+                                    <p:set>
+                                      <p:cBhvr>
+                                        <p:cTn id="29" dur="1" fill="hold">
+                                          <p:stCondLst>
+                                            <p:cond delay="0"/>
+                                          </p:stCondLst>
+                                        </p:cTn>
+                                        <p:tgtEl>
+                                          <p:spTgt spid="14"/>
+                                        </p:tgtEl>
+                                        <p:attrNameLst>
+                                          <p:attrName>style.visibility</p:attrName>
+                                        </p:attrNameLst>
+                                      </p:cBhvr>
+                                      <p:to>
+                                        <p:strVal val="visible"/>
+                                      </p:to>
+                                    </p:set>
+                                  </p:childTnLst>
+                                </p:cTn>
+                              </p:par>
+                            </p:childTnLst>
+                          </p:cTn>
+                        </p:par>
+                      </p:childTnLst>
+                    </p:cTn>
+                  </p:par>
+                  <p:par>
+                    <p:cTn id="30" fill="hold">
+                      <p:stCondLst>
+                        <p:cond delay="indefinite"/>
+                      </p:stCondLst>
+                      <p:childTnLst>
+                        <p:par>
+                          <p:cTn id="31" fill="hold">
+                            <p:stCondLst>
+                              <p:cond delay="0"/>
+                            </p:stCondLst>
+                            <p:childTnLst>
+                              <p:par>
+                                <p:cTn id="32" presetID="1" presetClass="entr" presetSubtype="0" fill="hold" nodeType="clickEffect">
+                                  <p:stCondLst>
+                                    <p:cond delay="0"/>
+                                  </p:stCondLst>
+                                  <p:childTnLst>
+                                    <p:set>
+                                      <p:cBhvr>
+                                        <p:cTn id="33" dur="1" fill="hold">
+                                          <p:stCondLst>
+                                            <p:cond delay="0"/>
+                                          </p:stCondLst>
+                                        </p:cTn>
+                                        <p:tgtEl>
+                                          <p:spTgt spid="19"/>
+                                        </p:tgtEl>
+                                        <p:attrNameLst>
+                                          <p:attrName>style.visibility</p:attrName>
+                                        </p:attrNameLst>
+                                      </p:cBhvr>
+                                      <p:to>
+                                        <p:strVal val="visible"/>
+                                      </p:to>
+                                    </p:set>
+                                  </p:childTnLst>
+                                </p:cTn>
+                              </p:par>
+                            </p:childTnLst>
+                          </p:cTn>
+                        </p:par>
+                      </p:childTnLst>
+                    </p:cTn>
+                  </p:par>
+                  <p:par>
+                    <p:cTn id="34" fill="hold">
+                      <p:stCondLst>
+                        <p:cond delay="indefinite"/>
+                      </p:stCondLst>
+                      <p:childTnLst>
+                        <p:par>
+                          <p:cTn id="35" fill="hold">
+                            <p:stCondLst>
+                              <p:cond delay="0"/>
+                            </p:stCondLst>
+                            <p:childTnLst>
+                              <p:par>
+                                <p:cTn id="36" presetID="1" presetClass="entr" presetSubtype="0" fill="hold" nodeType="clickEffect">
+                                  <p:stCondLst>
+                                    <p:cond delay="0"/>
+                                  </p:stCondLst>
+                                  <p:childTnLst>
+                                    <p:set>
+                                      <p:cBhvr>
+                                        <p:cTn id="37" dur="1" fill="hold">
+                                          <p:stCondLst>
+                                            <p:cond delay="0"/>
+                                          </p:stCondLst>
+                                        </p:cTn>
+                                        <p:tgtEl>
+                                          <p:spTgt spid="15"/>
+                                        </p:tgtEl>
+                                        <p:attrNameLst>
+                                          <p:attrName>style.visibility</p:attrName>
+                                        </p:attrNameLst>
+                                      </p:cBhvr>
+                                      <p:to>
+                                        <p:strVal val="visible"/>
+                                      </p:to>
+                                    </p:set>
+                                  </p:childTnLst>
+                                </p:cTn>
+                              </p:par>
+                            </p:childTnLst>
+                          </p:cTn>
+                        </p:par>
+                      </p:childTnLst>
+                    </p:cTn>
+                  </p:par>
+                </p:childTnLst>
+              </p:cTn>
+              <p:prevCondLst>
+                <p:cond evt="onPrev" delay="0">
+                  <p:tgtEl>
+                    <p:sldTgt/>
+                  </p:tgtEl>
+                </p:cond>
+              </p:prevCondLst>
+              <p:nextCondLst>
+                <p:cond evt="onNext" delay="0">
+                  <p:tgtEl>
+                    <p:sldTgt/>
+                  </p:tgtEl>
+                </p:cond>
+              </p:nextCondLst>
+            </p:seq>
+          </p:childTnLst>
+        </p:cTn>
+      </p:par>
+    </p:tnLst>
+    <p:bldLst>
+      <p:bldP spid="18" grpId="0"/>
+      <p:bldP spid="18" grpId="1"/>
+    </p:bldLst>
+  </p:timing>
+</p:sld>
+</file>
+
+<file path=ppt/slides/slide3.xml><?xml version="1.0" encoding="utf-8"?>
+<p:sld xmlns:a="http://schemas.openxmlformats.org/drawingml/2006/main" xmlns:r="http://schemas.openxmlformats.org/officeDocument/2006/relationships" xmlns:p="http://schemas.openxmlformats.org/presentationml/2006/main">
+  <p:cSld>
+    <p:spTree>
+      <p:nvGrpSpPr>
+        <p:cNvPr id="1" name=""/>
+        <p:cNvGrpSpPr/>
+        <p:nvPr/>
+      </p:nvGrpSpPr>
+      <p:grpSpPr>
+        <a:xfrm>
+          <a:off x="0" y="0"/>
+          <a:ext cx="0" cy="0"/>
+          <a:chOff x="0" y="0"/>
+          <a:chExt cx="0" cy="0"/>
+        </a:xfrm>
+      </p:grpSpPr>
+      <p:sp>
+        <p:nvSpPr>
+          <p:cNvPr id="2" name="Title 1">
+            <a:extLst>
+              <a:ext uri="{FF2B5EF4-FFF2-40B4-BE49-F238E27FC236}">
+                <a16:creationId xmlns:a16="http://schemas.microsoft.com/office/drawing/2014/main" id="{EFBE6545-F143-5740-BBDD-BC733D1F4307}"/>
+              </a:ext>
+            </a:extLst>
+          </p:cNvPr>
+          <p:cNvSpPr>
+            <a:spLocks noGrp="1"/>
+          </p:cNvSpPr>
+          <p:nvPr>
+            <p:ph type="title"/>
+          </p:nvPr>
+        </p:nvSpPr>
+        <p:spPr/>
+        <p:txBody>
+          <a:bodyPr/>
+          <a:lstStyle/>
+          <a:p>
+            <a:r>
+              <a:rPr lang="en-US" dirty="0"/>
+              <a:t>Relativistic Two-Electron Integrals</a:t>
+            </a:r>
+          </a:p>
+        </p:txBody>
+      </p:sp>
+      <p:sp>
+        <p:nvSpPr>
+          <p:cNvPr id="4" name="Slide Number Placeholder 3">
+            <a:extLst>
+              <a:ext uri="{FF2B5EF4-FFF2-40B4-BE49-F238E27FC236}">
+                <a16:creationId xmlns:a16="http://schemas.microsoft.com/office/drawing/2014/main" id="{1F5CA9B0-1415-B248-A36C-D4E5A4799819}"/>
+              </a:ext>
+            </a:extLst>
+          </p:cNvPr>
+          <p:cNvSpPr>
+            <a:spLocks noGrp="1"/>
+          </p:cNvSpPr>
+          <p:nvPr>
+            <p:ph type="sldNum" sz="quarter" idx="12"/>
+          </p:nvPr>
+        </p:nvSpPr>
+        <p:spPr/>
+        <p:txBody>
+          <a:bodyPr/>
+          <a:lstStyle/>
+          <a:p>
+            <a:fld id="{2CC1335D-5C6A-0B42-9745-CD5AAF743FE7}" type="slidenum">
+              <a:rPr lang="en-US" smtClean="0"/>
+              <a:t>3</a:t>
+            </a:fld>
+            <a:endParaRPr lang="en-US"/>
+          </a:p>
+        </p:txBody>
+      </p:sp>
+      <p:pic>
+        <p:nvPicPr>
+          <p:cNvPr id="8" name="Picture 7">
+            <a:extLst>
+              <a:ext uri="{FF2B5EF4-FFF2-40B4-BE49-F238E27FC236}">
+                <a16:creationId xmlns:a16="http://schemas.microsoft.com/office/drawing/2014/main" id="{554362BB-FD59-044D-831F-0CFFAD620642}"/>
+              </a:ext>
+            </a:extLst>
+          </p:cNvPr>
+          <p:cNvPicPr>
+            <a:picLocks noChangeAspect="1"/>
+          </p:cNvPicPr>
+          <p:nvPr/>
+        </p:nvPicPr>
+        <p:blipFill>
+          <a:blip r:embed="rId2"/>
+          <a:stretch>
+            <a:fillRect/>
+          </a:stretch>
+        </p:blipFill>
+        <p:spPr>
+          <a:xfrm>
+            <a:off x="838200" y="2328069"/>
+            <a:ext cx="6172200" cy="3390900"/>
+          </a:xfrm>
+          <a:prstGeom prst="rect">
+            <a:avLst/>
+          </a:prstGeom>
+        </p:spPr>
+      </p:pic>
+      <p:pic>
+        <p:nvPicPr>
+          <p:cNvPr id="9" name="Picture 8">
+            <a:extLst>
+              <a:ext uri="{FF2B5EF4-FFF2-40B4-BE49-F238E27FC236}">
+                <a16:creationId xmlns:a16="http://schemas.microsoft.com/office/drawing/2014/main" id="{CDE68D16-34E1-B24D-83F5-BAA9FB21C7E0}"/>
+              </a:ext>
+            </a:extLst>
+          </p:cNvPr>
+          <p:cNvPicPr>
+            <a:picLocks noChangeAspect="1"/>
+          </p:cNvPicPr>
+          <p:nvPr/>
+        </p:nvPicPr>
+        <p:blipFill>
+          <a:blip r:embed="rId3"/>
+          <a:stretch>
+            <a:fillRect/>
+          </a:stretch>
+        </p:blipFill>
+        <p:spPr>
+          <a:xfrm>
+            <a:off x="7676800" y="3016670"/>
+            <a:ext cx="1346200" cy="203200"/>
+          </a:xfrm>
+          <a:prstGeom prst="rect">
+            <a:avLst/>
+          </a:prstGeom>
+        </p:spPr>
+      </p:pic>
+      <p:sp>
+        <p:nvSpPr>
+          <p:cNvPr id="10" name="TextBox 9">
+            <a:extLst>
+              <a:ext uri="{FF2B5EF4-FFF2-40B4-BE49-F238E27FC236}">
+                <a16:creationId xmlns:a16="http://schemas.microsoft.com/office/drawing/2014/main" id="{4AE96BE0-4210-0649-8D88-BF0669B9A6E9}"/>
+              </a:ext>
+            </a:extLst>
+          </p:cNvPr>
+          <p:cNvSpPr txBox="1"/>
+          <p:nvPr/>
+        </p:nvSpPr>
+        <p:spPr>
+          <a:xfrm>
+            <a:off x="9169266" y="2933604"/>
+            <a:ext cx="1829925" cy="369332"/>
+          </a:xfrm>
+          <a:prstGeom prst="rect">
+            <a:avLst/>
+          </a:prstGeom>
+          <a:noFill/>
+        </p:spPr>
+        <p:txBody>
+          <a:bodyPr wrap="none" rtlCol="0">
+            <a:spAutoFit/>
+          </a:bodyPr>
+          <a:lstStyle/>
+          <a:p>
+            <a:r>
+              <a:rPr lang="en-US" dirty="0"/>
+              <a:t>Spinor symmetry</a:t>
+            </a:r>
+          </a:p>
+        </p:txBody>
+      </p:sp>
+      <p:pic>
+        <p:nvPicPr>
+          <p:cNvPr id="11" name="Picture 10">
+            <a:extLst>
+              <a:ext uri="{FF2B5EF4-FFF2-40B4-BE49-F238E27FC236}">
+                <a16:creationId xmlns:a16="http://schemas.microsoft.com/office/drawing/2014/main" id="{77980892-F1A5-464D-AE0D-26A26EBED616}"/>
+              </a:ext>
+            </a:extLst>
+          </p:cNvPr>
+          <p:cNvPicPr>
+            <a:picLocks noChangeAspect="1"/>
+          </p:cNvPicPr>
+          <p:nvPr/>
+        </p:nvPicPr>
+        <p:blipFill>
+          <a:blip r:embed="rId4"/>
+          <a:stretch>
+            <a:fillRect/>
+          </a:stretch>
+        </p:blipFill>
+        <p:spPr>
+          <a:xfrm>
+            <a:off x="7486300" y="3480626"/>
+            <a:ext cx="1727200" cy="203200"/>
+          </a:xfrm>
+          <a:prstGeom prst="rect">
+            <a:avLst/>
+          </a:prstGeom>
+        </p:spPr>
+      </p:pic>
+      <p:sp>
+        <p:nvSpPr>
+          <p:cNvPr id="12" name="TextBox 11">
+            <a:extLst>
+              <a:ext uri="{FF2B5EF4-FFF2-40B4-BE49-F238E27FC236}">
+                <a16:creationId xmlns:a16="http://schemas.microsoft.com/office/drawing/2014/main" id="{D9919C49-644D-D84E-AA06-E39E8D6B47A3}"/>
+              </a:ext>
+            </a:extLst>
+          </p:cNvPr>
+          <p:cNvSpPr txBox="1"/>
+          <p:nvPr/>
+        </p:nvSpPr>
+        <p:spPr>
+          <a:xfrm>
+            <a:off x="9169266" y="3364021"/>
+            <a:ext cx="1580882" cy="369332"/>
+          </a:xfrm>
+          <a:prstGeom prst="rect">
+            <a:avLst/>
+          </a:prstGeom>
+          <a:noFill/>
+        </p:spPr>
+        <p:txBody>
+          <a:bodyPr wrap="none" rtlCol="0">
+            <a:spAutoFit/>
+          </a:bodyPr>
+          <a:lstStyle/>
+          <a:p>
+            <a:r>
+              <a:rPr lang="en-US" dirty="0"/>
+              <a:t>Basis functions</a:t>
+            </a:r>
+          </a:p>
+        </p:txBody>
+      </p:sp>
+      <p:pic>
+        <p:nvPicPr>
+          <p:cNvPr id="13" name="Picture 12">
+            <a:extLst>
+              <a:ext uri="{FF2B5EF4-FFF2-40B4-BE49-F238E27FC236}">
+                <a16:creationId xmlns:a16="http://schemas.microsoft.com/office/drawing/2014/main" id="{592E4D84-945C-4943-A662-21EF3F5ECE3A}"/>
+              </a:ext>
+            </a:extLst>
+          </p:cNvPr>
+          <p:cNvPicPr>
+            <a:picLocks noChangeAspect="1"/>
+          </p:cNvPicPr>
+          <p:nvPr/>
+        </p:nvPicPr>
+        <p:blipFill>
+          <a:blip r:embed="rId5"/>
+          <a:stretch>
+            <a:fillRect/>
+          </a:stretch>
+        </p:blipFill>
+        <p:spPr>
+          <a:xfrm>
+            <a:off x="7493089" y="3944583"/>
+            <a:ext cx="101600" cy="152400"/>
+          </a:xfrm>
+          <a:prstGeom prst="rect">
+            <a:avLst/>
+          </a:prstGeom>
+        </p:spPr>
+      </p:pic>
+      <p:sp>
+        <p:nvSpPr>
+          <p:cNvPr id="14" name="TextBox 13">
+            <a:extLst>
+              <a:ext uri="{FF2B5EF4-FFF2-40B4-BE49-F238E27FC236}">
+                <a16:creationId xmlns:a16="http://schemas.microsoft.com/office/drawing/2014/main" id="{47208284-C0C3-234D-8493-06817B727C3B}"/>
+              </a:ext>
+            </a:extLst>
+          </p:cNvPr>
+          <p:cNvSpPr txBox="1"/>
+          <p:nvPr/>
+        </p:nvSpPr>
+        <p:spPr>
+          <a:xfrm>
+            <a:off x="9169266" y="3794438"/>
+            <a:ext cx="2104038" cy="646331"/>
+          </a:xfrm>
+          <a:prstGeom prst="rect">
+            <a:avLst/>
+          </a:prstGeom>
+          <a:noFill/>
+        </p:spPr>
+        <p:txBody>
+          <a:bodyPr wrap="none" rtlCol="0">
+            <a:spAutoFit/>
+          </a:bodyPr>
+          <a:lstStyle/>
+          <a:p>
+            <a:r>
+              <a:rPr lang="en-US" dirty="0"/>
+              <a:t>Function returning 2</a:t>
+            </a:r>
+          </a:p>
+          <a:p>
+            <a:r>
+              <a:rPr lang="en-US" dirty="0"/>
+              <a:t>integers  </a:t>
+            </a:r>
+          </a:p>
+        </p:txBody>
+      </p:sp>
+      <p:pic>
+        <p:nvPicPr>
+          <p:cNvPr id="15" name="Picture 14">
+            <a:extLst>
+              <a:ext uri="{FF2B5EF4-FFF2-40B4-BE49-F238E27FC236}">
+                <a16:creationId xmlns:a16="http://schemas.microsoft.com/office/drawing/2014/main" id="{B6403D72-5ED9-A84D-BE8E-404561920ADF}"/>
+              </a:ext>
+            </a:extLst>
+          </p:cNvPr>
+          <p:cNvPicPr>
+            <a:picLocks noChangeAspect="1"/>
+          </p:cNvPicPr>
+          <p:nvPr/>
+        </p:nvPicPr>
+        <p:blipFill>
+          <a:blip r:embed="rId6"/>
+          <a:stretch>
+            <a:fillRect/>
+          </a:stretch>
+        </p:blipFill>
+        <p:spPr>
+          <a:xfrm>
+            <a:off x="7474039" y="4615820"/>
+            <a:ext cx="139700" cy="152400"/>
+          </a:xfrm>
+          <a:prstGeom prst="rect">
+            <a:avLst/>
+          </a:prstGeom>
+        </p:spPr>
+      </p:pic>
+      <p:sp>
+        <p:nvSpPr>
+          <p:cNvPr id="17" name="TextBox 16">
+            <a:extLst>
+              <a:ext uri="{FF2B5EF4-FFF2-40B4-BE49-F238E27FC236}">
+                <a16:creationId xmlns:a16="http://schemas.microsoft.com/office/drawing/2014/main" id="{D465AFD2-693D-344C-B27A-832FD89517D6}"/>
+              </a:ext>
+            </a:extLst>
+          </p:cNvPr>
+          <p:cNvSpPr txBox="1"/>
+          <p:nvPr/>
+        </p:nvSpPr>
+        <p:spPr>
+          <a:xfrm>
+            <a:off x="9169266" y="4507354"/>
+            <a:ext cx="1877950" cy="369332"/>
+          </a:xfrm>
+          <a:prstGeom prst="rect">
+            <a:avLst/>
+          </a:prstGeom>
+          <a:noFill/>
+        </p:spPr>
+        <p:txBody>
+          <a:bodyPr wrap="none" rtlCol="0">
+            <a:spAutoFit/>
+          </a:bodyPr>
+          <a:lstStyle/>
+          <a:p>
+            <a:r>
+              <a:rPr lang="en-US" dirty="0"/>
+              <a:t>Large component</a:t>
+            </a:r>
+          </a:p>
+        </p:txBody>
+      </p:sp>
+      <p:pic>
+        <p:nvPicPr>
+          <p:cNvPr id="18" name="Picture 17">
+            <a:extLst>
+              <a:ext uri="{FF2B5EF4-FFF2-40B4-BE49-F238E27FC236}">
+                <a16:creationId xmlns:a16="http://schemas.microsoft.com/office/drawing/2014/main" id="{A14A52B1-9DC4-BA4B-BC60-DAF029F287F7}"/>
+              </a:ext>
+            </a:extLst>
+          </p:cNvPr>
+          <p:cNvPicPr>
+            <a:picLocks noChangeAspect="1"/>
+          </p:cNvPicPr>
+          <p:nvPr/>
+        </p:nvPicPr>
+        <p:blipFill>
+          <a:blip r:embed="rId7"/>
+          <a:stretch>
+            <a:fillRect/>
+          </a:stretch>
+        </p:blipFill>
+        <p:spPr>
+          <a:xfrm>
+            <a:off x="7486300" y="5028977"/>
+            <a:ext cx="139700" cy="177800"/>
+          </a:xfrm>
+          <a:prstGeom prst="rect">
+            <a:avLst/>
+          </a:prstGeom>
+        </p:spPr>
+      </p:pic>
+      <p:sp>
+        <p:nvSpPr>
+          <p:cNvPr id="19" name="TextBox 18">
+            <a:extLst>
+              <a:ext uri="{FF2B5EF4-FFF2-40B4-BE49-F238E27FC236}">
+                <a16:creationId xmlns:a16="http://schemas.microsoft.com/office/drawing/2014/main" id="{732C01D5-F738-9241-91DF-E139006131A1}"/>
+              </a:ext>
+            </a:extLst>
+          </p:cNvPr>
+          <p:cNvSpPr txBox="1"/>
+          <p:nvPr/>
+        </p:nvSpPr>
+        <p:spPr>
+          <a:xfrm>
+            <a:off x="9164126" y="4932271"/>
+            <a:ext cx="1823704" cy="369332"/>
+          </a:xfrm>
+          <a:prstGeom prst="rect">
+            <a:avLst/>
+          </a:prstGeom>
+          <a:noFill/>
+        </p:spPr>
+        <p:txBody>
+          <a:bodyPr wrap="none" rtlCol="0">
+            <a:spAutoFit/>
+          </a:bodyPr>
+          <a:lstStyle/>
+          <a:p>
+            <a:r>
+              <a:rPr lang="en-US" dirty="0"/>
+              <a:t>Small component</a:t>
+            </a:r>
+          </a:p>
+        </p:txBody>
+      </p:sp>
+    </p:spTree>
+    <p:extLst>
+      <p:ext uri="{BB962C8B-B14F-4D97-AF65-F5344CB8AC3E}">
+        <p14:creationId xmlns:p14="http://schemas.microsoft.com/office/powerpoint/2010/main" val="3749306618"/>
+      </p:ext>
+    </p:extLst>
+  </p:cSld>
+  <p:clrMapOvr>
+    <a:masterClrMapping/>
+  </p:clrMapOvr>
+</p:sld>
+</file>
+
+<file path=ppt/slides/slide4.xml><?xml version="1.0" encoding="utf-8"?>
+<p:sld xmlns:a="http://schemas.openxmlformats.org/drawingml/2006/main" xmlns:r="http://schemas.openxmlformats.org/officeDocument/2006/relationships" xmlns:p="http://schemas.openxmlformats.org/presentationml/2006/main">
+  <p:cSld>
+    <p:spTree>
+      <p:nvGrpSpPr>
+        <p:cNvPr id="1" name=""/>
+        <p:cNvGrpSpPr/>
+        <p:nvPr/>
+      </p:nvGrpSpPr>
+      <p:grpSpPr>
+        <a:xfrm>
+          <a:off x="0" y="0"/>
+          <a:ext cx="0" cy="0"/>
+          <a:chOff x="0" y="0"/>
+          <a:chExt cx="0" cy="0"/>
+        </a:xfrm>
+      </p:grpSpPr>
+      <p:sp>
+        <p:nvSpPr>
+          <p:cNvPr id="2" name="Title 1"/>
+          <p:cNvSpPr>
+            <a:spLocks noGrp="1"/>
+          </p:cNvSpPr>
+          <p:nvPr>
+            <p:ph type="title"/>
+          </p:nvPr>
+        </p:nvSpPr>
+        <p:spPr/>
+        <p:txBody>
+          <a:bodyPr/>
+          <a:lstStyle/>
+          <a:p>
+            <a:r>
+              <a:rPr lang="en-US" dirty="0"/>
               <a:t>GPU Architecture: Threads, Warps, Blocks, and Grid</a:t>
             </a:r>
-            <a:endParaRPr lang="en-US" dirty="0"/>
           </a:p>
         </p:txBody>
       </p:sp>
@@ -3545,7 +6189,7 @@
           <a:p>
             <a:fld id="{2CC1335D-5C6A-0B42-9745-CD5AAF743FE7}" type="slidenum">
               <a:rPr lang="en-US" smtClean="0"/>
-              <a:t>2</a:t>
+              <a:t>4</a:t>
             </a:fld>
             <a:endParaRPr lang="en-US"/>
           </a:p>
@@ -3604,10 +6248,9 @@
           <a:lstStyle/>
           <a:p>
             <a:r>
-              <a:rPr lang="en-US" dirty="0" smtClean="0"/>
+              <a:rPr lang="en-US" dirty="0"/>
               <a:t>Thread: The simplest unit of computation in CUDA. Threads are what actually perform the instructions in the code.</a:t>
             </a:r>
-            <a:endParaRPr lang="en-US" dirty="0"/>
           </a:p>
         </p:txBody>
       </p:sp>
@@ -3717,10 +6360,9 @@
           <a:lstStyle/>
           <a:p>
             <a:r>
-              <a:rPr lang="en-US" dirty="0" smtClean="0"/>
+              <a:rPr lang="en-US" dirty="0"/>
               <a:t>Warp: A collection of 32 threads. All threads in a warp execute in lockstep. Not directly accessible in code, but it is fundamental to understand in order to maximize performance.</a:t>
             </a:r>
-            <a:endParaRPr lang="en-US" dirty="0"/>
           </a:p>
         </p:txBody>
       </p:sp>
@@ -3828,58 +6470,57 @@
           <a:lstStyle/>
           <a:p>
             <a:r>
-              <a:rPr lang="en-US" dirty="0" smtClean="0"/>
+              <a:rPr lang="en-US" dirty="0"/>
               <a:t>Block: A collection of an arbitrary number of threads. The exact number can be specified in code. Blocks can have up to three dimensions, which provide the </a:t>
             </a:r>
             <a:r>
-              <a:rPr lang="en-US" dirty="0" err="1" smtClean="0"/>
+              <a:rPr lang="en-US" dirty="0" err="1"/>
               <a:t>threadIdx.x</a:t>
             </a:r>
             <a:r>
-              <a:rPr lang="en-US" dirty="0" smtClean="0"/>
+              <a:rPr lang="en-US" dirty="0"/>
               <a:t>, </a:t>
             </a:r>
             <a:r>
-              <a:rPr lang="en-US" dirty="0" err="1" smtClean="0"/>
+              <a:rPr lang="en-US" dirty="0" err="1"/>
               <a:t>threadIdx.y</a:t>
             </a:r>
             <a:r>
-              <a:rPr lang="en-US" dirty="0" smtClean="0"/>
+              <a:rPr lang="en-US" dirty="0"/>
               <a:t>, </a:t>
             </a:r>
             <a:r>
-              <a:rPr lang="en-US" dirty="0" err="1" smtClean="0"/>
+              <a:rPr lang="en-US" dirty="0" err="1"/>
               <a:t>threadIdx.z</a:t>
             </a:r>
             <a:r>
-              <a:rPr lang="en-US" dirty="0" smtClean="0"/>
+              <a:rPr lang="en-US" dirty="0"/>
               <a:t>, </a:t>
             </a:r>
             <a:r>
-              <a:rPr lang="en-US" dirty="0" err="1" smtClean="0"/>
+              <a:rPr lang="en-US" dirty="0" err="1"/>
               <a:t>blockDim.x</a:t>
             </a:r>
             <a:r>
-              <a:rPr lang="en-US" dirty="0" smtClean="0"/>
+              <a:rPr lang="en-US" dirty="0"/>
               <a:t>, </a:t>
             </a:r>
             <a:r>
-              <a:rPr lang="en-US" dirty="0" err="1" smtClean="0"/>
+              <a:rPr lang="en-US" dirty="0" err="1"/>
               <a:t>blockDim.y</a:t>
             </a:r>
             <a:r>
-              <a:rPr lang="en-US" dirty="0" smtClean="0"/>
+              <a:rPr lang="en-US" dirty="0"/>
               <a:t>, and </a:t>
             </a:r>
             <a:r>
-              <a:rPr lang="en-US" dirty="0" err="1" smtClean="0"/>
+              <a:rPr lang="en-US" dirty="0" err="1"/>
               <a:t>blockDim.z</a:t>
             </a:r>
             <a:r>
-              <a:rPr lang="en-US" dirty="0" smtClean="0"/>
+              <a:rPr lang="en-US" dirty="0"/>
               <a:t> variables. The block in this image is a 8 x 4 block (one warp) of threads. A block can have 1024 threads at most.</a:t>
             </a:r>
-            <a:endParaRPr lang="en-US" dirty="0"/>
           </a:p>
         </p:txBody>
       </p:sp>
@@ -3987,66 +6628,57 @@
           <a:lstStyle/>
           <a:p>
             <a:r>
-              <a:rPr lang="en-US" dirty="0" smtClean="0"/>
-              <a:t>Grid: A collection of an arbitrary number of blocks. </a:t>
-            </a:r>
-            <a:r>
-              <a:rPr lang="en-US" dirty="0" smtClean="0"/>
-              <a:t>The exact number can be specified in code. Grids can have up to three dimensions, which provide the </a:t>
-            </a:r>
-            <a:r>
-              <a:rPr lang="en-US" dirty="0" err="1" smtClean="0"/>
+              <a:rPr lang="en-US" dirty="0"/>
+              <a:t>Grid: A collection of an arbitrary number of blocks. The exact number can be specified in code. Grids can have up to three dimensions, which provide the </a:t>
+            </a:r>
+            <a:r>
+              <a:rPr lang="en-US" dirty="0" err="1"/>
               <a:t>blockIdx.x</a:t>
             </a:r>
             <a:r>
-              <a:rPr lang="en-US" dirty="0" smtClean="0"/>
+              <a:rPr lang="en-US" dirty="0"/>
               <a:t>, </a:t>
             </a:r>
             <a:r>
-              <a:rPr lang="en-US" dirty="0" err="1" smtClean="0"/>
+              <a:rPr lang="en-US" dirty="0" err="1"/>
               <a:t>blockIdx.y</a:t>
             </a:r>
             <a:r>
-              <a:rPr lang="en-US" dirty="0" smtClean="0"/>
+              <a:rPr lang="en-US" dirty="0"/>
               <a:t>, </a:t>
             </a:r>
             <a:r>
-              <a:rPr lang="en-US" dirty="0" err="1" smtClean="0"/>
+              <a:rPr lang="en-US" dirty="0" err="1"/>
               <a:t>blockIdx.z</a:t>
             </a:r>
             <a:r>
-              <a:rPr lang="en-US" dirty="0" smtClean="0"/>
+              <a:rPr lang="en-US" dirty="0"/>
               <a:t>, </a:t>
             </a:r>
             <a:r>
-              <a:rPr lang="en-US" dirty="0" err="1" smtClean="0"/>
+              <a:rPr lang="en-US" dirty="0" err="1"/>
               <a:t>gridDim.x</a:t>
             </a:r>
             <a:r>
-              <a:rPr lang="en-US" dirty="0" smtClean="0"/>
+              <a:rPr lang="en-US" dirty="0"/>
               <a:t>, </a:t>
             </a:r>
             <a:r>
-              <a:rPr lang="en-US" dirty="0" err="1" smtClean="0"/>
+              <a:rPr lang="en-US" dirty="0" err="1"/>
               <a:t>gridDim.y</a:t>
             </a:r>
             <a:r>
-              <a:rPr lang="en-US" dirty="0" smtClean="0"/>
+              <a:rPr lang="en-US" dirty="0"/>
               <a:t>, and </a:t>
             </a:r>
             <a:r>
-              <a:rPr lang="en-US" dirty="0" err="1" smtClean="0"/>
+              <a:rPr lang="en-US" dirty="0" err="1"/>
               <a:t>gridDim.z</a:t>
             </a:r>
             <a:r>
-              <a:rPr lang="en-US" dirty="0" smtClean="0"/>
-              <a:t> variables. The grid in this image is a 2 x 2 grid of blocks.</a:t>
-            </a:r>
-            <a:r>
-              <a:rPr lang="en-US" dirty="0" smtClean="0"/>
-              <a:t> </a:t>
-            </a:r>
-            <a:endParaRPr lang="en-US" dirty="0"/>
+              <a:rPr lang="en-US" dirty="0"/>
+              <a:t> variables. The grid in this image is a 2 x 2 grid of blocks. </a:t>
+            </a:r>
           </a:p>
         </p:txBody>
       </p:sp>
@@ -4745,7 +7377,7 @@
 </p:sld>
 </file>
 
-<file path=ppt/slides/slide3.xml><?xml version="1.0" encoding="utf-8"?>
+<file path=ppt/slides/slide5.xml><?xml version="1.0" encoding="utf-8"?>
 <p:sld xmlns:a="http://schemas.openxmlformats.org/drawingml/2006/main" xmlns:r="http://schemas.openxmlformats.org/officeDocument/2006/relationships" xmlns:p="http://schemas.openxmlformats.org/presentationml/2006/main">
   <p:cSld>
     <p:spTree>
@@ -4778,18 +7410,9 @@
           <a:lstStyle/>
           <a:p>
             <a:r>
-              <a:rPr lang="en-US" dirty="0" smtClean="0"/>
-              <a:t>GPU Architecture: </a:t>
-            </a:r>
-            <a:r>
-              <a:rPr lang="en-US" dirty="0" smtClean="0"/>
-              <a:t>Streaming Multiprocessor </a:t>
-            </a:r>
-            <a:r>
-              <a:rPr lang="en-US" dirty="0" smtClean="0"/>
-              <a:t>Memory Resources</a:t>
-            </a:r>
-            <a:endParaRPr lang="en-US" dirty="0"/>
+              <a:rPr lang="en-US" dirty="0"/>
+              <a:t>GPU Architecture: Streaming Multiprocessor Memory Resources</a:t>
+            </a:r>
           </a:p>
         </p:txBody>
       </p:sp>
@@ -4810,7 +7433,7 @@
           <a:p>
             <a:fld id="{2CC1335D-5C6A-0B42-9745-CD5AAF743FE7}" type="slidenum">
               <a:rPr lang="en-US" smtClean="0"/>
-              <a:t>3</a:t>
+              <a:t>5</a:t>
             </a:fld>
             <a:endParaRPr lang="en-US"/>
           </a:p>
@@ -4870,17 +7493,8 @@
           <a:p>
             <a:r>
               <a:rPr lang="en-US" dirty="0"/>
-              <a:t>S</a:t>
-            </a:r>
-            <a:r>
-              <a:rPr lang="en-US" dirty="0" smtClean="0"/>
-              <a:t>treaming Multiprocessor (SM): </a:t>
-            </a:r>
-            <a:r>
-              <a:rPr lang="en-US" dirty="0" smtClean="0"/>
-              <a:t>Except for global memory, all GPU resources are local to a SM. The number of SMs per GPU depends on hardware generation. SMs can run at most 48 warps (1536 threads), or at most 8 blocks. Blocks cannot be divided between SMs.</a:t>
-            </a:r>
-            <a:endParaRPr lang="en-US" dirty="0"/>
+              <a:t>Streaming Multiprocessor (SM): Except for global memory, all GPU resources are local to a SM. The number of SMs per GPU depends on hardware generation. SMs can run at most 48 warps (1536 threads), or at most 8 blocks. Blocks cannot be divided between SMs.</a:t>
+            </a:r>
           </a:p>
         </p:txBody>
       </p:sp>
@@ -4988,10 +7602,9 @@
           <a:lstStyle/>
           <a:p>
             <a:r>
-              <a:rPr lang="en-US" dirty="0" smtClean="0"/>
+              <a:rPr lang="en-US" dirty="0"/>
               <a:t>Register Memory: Local to a specific thread. Fastest memory available, but also the least plentiful. The total amount of registers on an SM is shared equally across all threads running on the SM so the registers needed per thread contributes to the maximum number of threads that can run at once.</a:t>
             </a:r>
-            <a:endParaRPr lang="en-US" dirty="0"/>
           </a:p>
         </p:txBody>
       </p:sp>
@@ -5101,20 +7714,16 @@
           <a:lstStyle/>
           <a:p>
             <a:r>
-              <a:rPr lang="en-US" dirty="0" smtClean="0"/>
+              <a:rPr lang="en-US" dirty="0"/>
               <a:t>Shared </a:t>
             </a:r>
             <a:r>
-              <a:rPr lang="en-US" dirty="0" err="1" smtClean="0"/>
+              <a:rPr lang="en-US" dirty="0" err="1"/>
               <a:t>emory</a:t>
             </a:r>
             <a:r>
-              <a:rPr lang="en-US" dirty="0" smtClean="0"/>
-              <a:t>: Local to a specific block. Slower than register memory, but more of it is available. The total amount of shared memory available is shared equally across all blocks running on the </a:t>
-            </a:r>
-            <a:r>
-              <a:rPr lang="en-US" dirty="0" smtClean="0"/>
-              <a:t>SM so the amount of shared memory needed per block contributes to the maximum number of threads that can run at once. Analogous to RAM in normal computing.</a:t>
+              <a:rPr lang="en-US" dirty="0"/>
+              <a:t>: Local to a specific block. Slower than register memory, but more of it is available. The total amount of shared memory available is shared equally across all blocks running on the SM so the amount of shared memory needed per block contributes to the maximum number of threads that can run at once. Analogous to RAM in normal computing.</a:t>
             </a:r>
           </a:p>
         </p:txBody>
@@ -5658,7 +8267,7 @@
 </p:sld>
 </file>
 
-<file path=ppt/slides/slide4.xml><?xml version="1.0" encoding="utf-8"?>
+<file path=ppt/slides/slide6.xml><?xml version="1.0" encoding="utf-8"?>
 <p:sld xmlns:a="http://schemas.openxmlformats.org/drawingml/2006/main" xmlns:r="http://schemas.openxmlformats.org/officeDocument/2006/relationships" xmlns:p="http://schemas.openxmlformats.org/presentationml/2006/main">
   <p:cSld>
     <p:spTree>
@@ -5691,10 +8300,9 @@
           <a:lstStyle/>
           <a:p>
             <a:r>
-              <a:rPr lang="en-US" dirty="0" smtClean="0"/>
+              <a:rPr lang="en-US" dirty="0"/>
               <a:t>GPU Architecture: Global Memory</a:t>
             </a:r>
-            <a:endParaRPr lang="en-US" dirty="0"/>
           </a:p>
         </p:txBody>
       </p:sp>
@@ -5715,7 +8323,7 @@
           <a:p>
             <a:fld id="{2CC1335D-5C6A-0B42-9745-CD5AAF743FE7}" type="slidenum">
               <a:rPr lang="en-US" smtClean="0"/>
-              <a:t>4</a:t>
+              <a:t>6</a:t>
             </a:fld>
             <a:endParaRPr lang="en-US"/>
           </a:p>
@@ -5774,10 +8382,9 @@
           <a:lstStyle/>
           <a:p>
             <a:r>
-              <a:rPr lang="en-US" dirty="0" smtClean="0"/>
+              <a:rPr lang="en-US" dirty="0"/>
               <a:t>Global Memory: Available to all threads on a GPU. The slowest memory type available, but also the most plentiful. Analogous to hard drive space in normal computing. Data should be stored contiguously in order to minimize the performance hit from using it. </a:t>
             </a:r>
-            <a:endParaRPr lang="en-US" dirty="0"/>
           </a:p>
         </p:txBody>
       </p:sp>
@@ -5874,17 +8481,10 @@
   <p:clrMapOvr>
     <a:masterClrMapping/>
   </p:clrMapOvr>
-  <p:timing>
-    <p:tnLst>
-      <p:par>
-        <p:cTn id="1" dur="indefinite" restart="never" nodeType="tmRoot"/>
-      </p:par>
-    </p:tnLst>
-  </p:timing>
 </p:sld>
 </file>
 
-<file path=ppt/slides/slide5.xml><?xml version="1.0" encoding="utf-8"?>
+<file path=ppt/slides/slide7.xml><?xml version="1.0" encoding="utf-8"?>
 <p:sld xmlns:a="http://schemas.openxmlformats.org/drawingml/2006/main" xmlns:r="http://schemas.openxmlformats.org/officeDocument/2006/relationships" xmlns:p="http://schemas.openxmlformats.org/presentationml/2006/main">
   <p:cSld>
     <p:spTree>
@@ -5917,10 +8517,9 @@
           <a:lstStyle/>
           <a:p>
             <a:r>
-              <a:rPr lang="en-US" dirty="0" smtClean="0"/>
+              <a:rPr lang="en-US" dirty="0"/>
               <a:t>Matrix Multiplication Example</a:t>
             </a:r>
-            <a:endParaRPr lang="en-US" dirty="0"/>
           </a:p>
         </p:txBody>
       </p:sp>
@@ -5941,7 +8540,7 @@
           <a:p>
             <a:fld id="{2CC1335D-5C6A-0B42-9745-CD5AAF743FE7}" type="slidenum">
               <a:rPr lang="en-US" smtClean="0"/>
-              <a:t>5</a:t>
+              <a:t>7</a:t>
             </a:fld>
             <a:endParaRPr lang="en-US"/>
           </a:p>
@@ -5971,10 +8570,9 @@
           <a:p>
             <a:pPr algn="ctr"/>
             <a:r>
-              <a:rPr lang="en-US" smtClean="0"/>
+              <a:rPr lang="en-US"/>
               <a:t>A</a:t>
             </a:r>
-            <a:endParaRPr lang="en-US"/>
           </a:p>
         </p:txBody>
       </p:sp>
@@ -6002,10 +8600,9 @@
           <a:p>
             <a:pPr algn="ctr"/>
             <a:r>
-              <a:rPr lang="en-US" dirty="0" smtClean="0"/>
+              <a:rPr lang="en-US" dirty="0"/>
               <a:t>B</a:t>
             </a:r>
-            <a:endParaRPr lang="en-US" dirty="0"/>
           </a:p>
         </p:txBody>
       </p:sp>
@@ -6033,10 +8630,9 @@
           <a:p>
             <a:pPr algn="ctr"/>
             <a:r>
-              <a:rPr lang="en-US" dirty="0" smtClean="0"/>
+              <a:rPr lang="en-US" dirty="0"/>
               <a:t>C</a:t>
             </a:r>
-            <a:endParaRPr lang="en-US" dirty="0"/>
           </a:p>
         </p:txBody>
       </p:sp>
@@ -6064,10 +8660,9 @@
           <a:p>
             <a:pPr algn="ctr"/>
             <a:r>
-              <a:rPr lang="en-US" dirty="0" smtClean="0"/>
+              <a:rPr lang="en-US" dirty="0"/>
               <a:t>X</a:t>
             </a:r>
-            <a:endParaRPr lang="en-US" dirty="0"/>
           </a:p>
         </p:txBody>
       </p:sp>
@@ -6124,10 +8719,9 @@
           <a:lstStyle/>
           <a:p>
             <a:r>
-              <a:rPr lang="en-US" dirty="0" smtClean="0"/>
+              <a:rPr lang="en-US" dirty="0"/>
               <a:t>The matrices A, B, and C are stored in row-major order. So the rows of A and C can be read/written effectively. The columns of B cannot be read effectively.</a:t>
             </a:r>
-            <a:endParaRPr lang="en-US" dirty="0"/>
           </a:p>
         </p:txBody>
       </p:sp>
@@ -6213,17 +8807,10 @@
   <p:clrMapOvr>
     <a:masterClrMapping/>
   </p:clrMapOvr>
-  <p:timing>
-    <p:tnLst>
-      <p:par>
-        <p:cTn id="1" dur="indefinite" restart="never" nodeType="tmRoot"/>
-      </p:par>
-    </p:tnLst>
-  </p:timing>
 </p:sld>
 </file>
 
-<file path=ppt/slides/slide6.xml><?xml version="1.0" encoding="utf-8"?>
+<file path=ppt/slides/slide8.xml><?xml version="1.0" encoding="utf-8"?>
 <p:sld xmlns:a="http://schemas.openxmlformats.org/drawingml/2006/main" xmlns:r="http://schemas.openxmlformats.org/officeDocument/2006/relationships" xmlns:p="http://schemas.openxmlformats.org/presentationml/2006/main">
   <p:cSld>
     <p:spTree>
@@ -6256,10 +8843,9 @@
           <a:lstStyle/>
           <a:p>
             <a:r>
-              <a:rPr lang="en-US" dirty="0" smtClean="0"/>
+              <a:rPr lang="en-US" dirty="0"/>
               <a:t>Matrix Multiplication Example</a:t>
             </a:r>
-            <a:endParaRPr lang="en-US" dirty="0"/>
           </a:p>
         </p:txBody>
       </p:sp>
@@ -6280,7 +8866,7 @@
           <a:p>
             <a:fld id="{2CC1335D-5C6A-0B42-9745-CD5AAF743FE7}" type="slidenum">
               <a:rPr lang="en-US" smtClean="0"/>
-              <a:t>6</a:t>
+              <a:t>8</a:t>
             </a:fld>
             <a:endParaRPr lang="en-US"/>
           </a:p>
@@ -6310,10 +8896,9 @@
           <a:p>
             <a:pPr algn="ctr"/>
             <a:r>
-              <a:rPr lang="en-US" dirty="0" smtClean="0"/>
+              <a:rPr lang="en-US" dirty="0"/>
               <a:t>Global Memory</a:t>
             </a:r>
-            <a:endParaRPr lang="en-US" dirty="0"/>
           </a:p>
         </p:txBody>
       </p:sp>
@@ -6413,10 +8998,9 @@
           <a:p>
             <a:pPr algn="ctr"/>
             <a:r>
-              <a:rPr lang="en-US" dirty="0" smtClean="0"/>
+              <a:rPr lang="en-US" dirty="0"/>
               <a:t>Shared Memory</a:t>
             </a:r>
-            <a:endParaRPr lang="en-US" dirty="0"/>
           </a:p>
         </p:txBody>
       </p:sp>
@@ -6444,10 +9028,9 @@
           <a:p>
             <a:pPr algn="ctr"/>
             <a:r>
-              <a:rPr lang="en-US" dirty="0" smtClean="0"/>
+              <a:rPr lang="en-US" dirty="0"/>
               <a:t>Register Memory</a:t>
             </a:r>
-            <a:endParaRPr lang="en-US" dirty="0"/>
           </a:p>
         </p:txBody>
       </p:sp>
@@ -6968,10 +9551,9 @@
           <a:lstStyle/>
           <a:p>
             <a:r>
-              <a:rPr lang="en-US" dirty="0" smtClean="0"/>
+              <a:rPr lang="en-US" dirty="0"/>
               <a:t>Using a block size of 32x32 and a grid size of 2x2</a:t>
             </a:r>
-            <a:endParaRPr lang="en-US" dirty="0"/>
           </a:p>
         </p:txBody>
       </p:sp>
@@ -6998,18 +9580,17 @@
           <a:lstStyle/>
           <a:p>
             <a:r>
-              <a:rPr lang="en-US" smtClean="0"/>
+              <a:rPr lang="en-US"/>
               <a:t>Step 2: </a:t>
             </a:r>
             <a:r>
-              <a:rPr lang="en-US" dirty="0" smtClean="0"/>
+              <a:rPr lang="en-US" dirty="0"/>
               <a:t>Copy the first tiles of matrix A and </a:t>
             </a:r>
             <a:r>
-              <a:rPr lang="en-US" smtClean="0"/>
+              <a:rPr lang="en-US"/>
               <a:t>B into the shared memory</a:t>
             </a:r>
-            <a:endParaRPr lang="en-US"/>
           </a:p>
         </p:txBody>
       </p:sp>
@@ -7036,10 +9617,9 @@
           <a:lstStyle/>
           <a:p>
             <a:r>
-              <a:rPr lang="en-US" dirty="0" smtClean="0"/>
+              <a:rPr lang="en-US" dirty="0"/>
               <a:t>Step 3: Each thread independently multiplies the needed elements of A and B and stores the result in the register memory</a:t>
             </a:r>
-            <a:endParaRPr lang="en-US" dirty="0"/>
           </a:p>
         </p:txBody>
       </p:sp>
@@ -7066,10 +9646,9 @@
           <a:lstStyle/>
           <a:p>
             <a:r>
-              <a:rPr lang="en-US" dirty="0" smtClean="0"/>
+              <a:rPr lang="en-US" dirty="0"/>
               <a:t>Step 1: Map threads to elements of matrix C</a:t>
             </a:r>
-            <a:endParaRPr lang="en-US" dirty="0"/>
           </a:p>
         </p:txBody>
       </p:sp>
@@ -7096,11 +9675,11 @@
           <a:lstStyle/>
           <a:p>
             <a:r>
-              <a:rPr lang="en-US" dirty="0" smtClean="0"/>
+              <a:rPr lang="en-US" dirty="0"/>
               <a:t>Step 4: Copy next set of tiles into the </a:t>
             </a:r>
             <a:r>
-              <a:rPr lang="en-US" smtClean="0"/>
+              <a:rPr lang="en-US"/>
               <a:t>shared memory and repeat step 3</a:t>
             </a:r>
             <a:endParaRPr lang="en-US" dirty="0"/>
@@ -7130,10 +9709,9 @@
           <a:lstStyle/>
           <a:p>
             <a:r>
-              <a:rPr lang="en-US" dirty="0" smtClean="0"/>
+              <a:rPr lang="en-US" dirty="0"/>
               <a:t>Step 4: Copy result from the shared memory to the global memory</a:t>
             </a:r>
-            <a:endParaRPr lang="en-US" dirty="0"/>
           </a:p>
         </p:txBody>
       </p:sp>
@@ -8471,6 +11049,194 @@
 </p:sld>
 </file>
 
+<file path=ppt/slides/slide9.xml><?xml version="1.0" encoding="utf-8"?>
+<p:sld xmlns:a="http://schemas.openxmlformats.org/drawingml/2006/main" xmlns:r="http://schemas.openxmlformats.org/officeDocument/2006/relationships" xmlns:p="http://schemas.openxmlformats.org/presentationml/2006/main">
+  <p:cSld>
+    <p:spTree>
+      <p:nvGrpSpPr>
+        <p:cNvPr id="1" name=""/>
+        <p:cNvGrpSpPr/>
+        <p:nvPr/>
+      </p:nvGrpSpPr>
+      <p:grpSpPr>
+        <a:xfrm>
+          <a:off x="0" y="0"/>
+          <a:ext cx="0" cy="0"/>
+          <a:chOff x="0" y="0"/>
+          <a:chExt cx="0" cy="0"/>
+        </a:xfrm>
+      </p:grpSpPr>
+      <p:sp>
+        <p:nvSpPr>
+          <p:cNvPr id="2" name="Title 1">
+            <a:extLst>
+              <a:ext uri="{FF2B5EF4-FFF2-40B4-BE49-F238E27FC236}">
+                <a16:creationId xmlns:a16="http://schemas.microsoft.com/office/drawing/2014/main" id="{F70F1FCB-07C3-BB49-B2C9-871A5D9BD1A4}"/>
+              </a:ext>
+            </a:extLst>
+          </p:cNvPr>
+          <p:cNvSpPr>
+            <a:spLocks noGrp="1"/>
+          </p:cNvSpPr>
+          <p:nvPr>
+            <p:ph type="title"/>
+          </p:nvPr>
+        </p:nvSpPr>
+        <p:spPr/>
+        <p:txBody>
+          <a:bodyPr/>
+          <a:lstStyle/>
+          <a:p>
+            <a:r>
+              <a:rPr lang="en-US" dirty="0"/>
+              <a:t>Two-Electron Algorithm</a:t>
+            </a:r>
+          </a:p>
+        </p:txBody>
+      </p:sp>
+      <p:sp>
+        <p:nvSpPr>
+          <p:cNvPr id="4" name="Slide Number Placeholder 3">
+            <a:extLst>
+              <a:ext uri="{FF2B5EF4-FFF2-40B4-BE49-F238E27FC236}">
+                <a16:creationId xmlns:a16="http://schemas.microsoft.com/office/drawing/2014/main" id="{D47C332B-2DBF-6B4C-8F02-7089A6F752FF}"/>
+              </a:ext>
+            </a:extLst>
+          </p:cNvPr>
+          <p:cNvSpPr>
+            <a:spLocks noGrp="1"/>
+          </p:cNvSpPr>
+          <p:nvPr>
+            <p:ph type="sldNum" sz="quarter" idx="12"/>
+          </p:nvPr>
+        </p:nvSpPr>
+        <p:spPr/>
+        <p:txBody>
+          <a:bodyPr/>
+          <a:lstStyle/>
+          <a:p>
+            <a:fld id="{2CC1335D-5C6A-0B42-9745-CD5AAF743FE7}" type="slidenum">
+              <a:rPr lang="en-US" smtClean="0"/>
+              <a:t>9</a:t>
+            </a:fld>
+            <a:endParaRPr lang="en-US"/>
+          </a:p>
+        </p:txBody>
+      </p:sp>
+      <p:sp>
+        <p:nvSpPr>
+          <p:cNvPr id="12" name="TextBox 11">
+            <a:extLst>
+              <a:ext uri="{FF2B5EF4-FFF2-40B4-BE49-F238E27FC236}">
+                <a16:creationId xmlns:a16="http://schemas.microsoft.com/office/drawing/2014/main" id="{12C06680-FED9-BD46-A9F0-ED142EFB0097}"/>
+              </a:ext>
+            </a:extLst>
+          </p:cNvPr>
+          <p:cNvSpPr txBox="1"/>
+          <p:nvPr/>
+        </p:nvSpPr>
+        <p:spPr>
+          <a:xfrm>
+            <a:off x="5806939" y="3606994"/>
+            <a:ext cx="4968818" cy="923330"/>
+          </a:xfrm>
+          <a:prstGeom prst="rect">
+            <a:avLst/>
+          </a:prstGeom>
+          <a:noFill/>
+        </p:spPr>
+        <p:txBody>
+          <a:bodyPr wrap="square" rtlCol="0">
+            <a:spAutoFit/>
+          </a:bodyPr>
+          <a:lstStyle/>
+          <a:p>
+            <a:r>
+              <a:rPr lang="en-US" dirty="0"/>
+              <a:t>Six indices to loop over and a non-trivial method of</a:t>
+            </a:r>
+          </a:p>
+          <a:p>
+            <a:r>
+              <a:rPr lang="en-US" dirty="0"/>
+              <a:t>determining their maximum values makes this algorithm difficult to parallelize</a:t>
+            </a:r>
+          </a:p>
+        </p:txBody>
+      </p:sp>
+      <p:pic>
+        <p:nvPicPr>
+          <p:cNvPr id="14" name="Picture 13">
+            <a:extLst>
+              <a:ext uri="{FF2B5EF4-FFF2-40B4-BE49-F238E27FC236}">
+                <a16:creationId xmlns:a16="http://schemas.microsoft.com/office/drawing/2014/main" id="{E09870B1-D128-3440-9EF7-011911C04DCB}"/>
+              </a:ext>
+            </a:extLst>
+          </p:cNvPr>
+          <p:cNvPicPr>
+            <a:picLocks noChangeAspect="1"/>
+          </p:cNvPicPr>
+          <p:nvPr/>
+        </p:nvPicPr>
+        <p:blipFill>
+          <a:blip r:embed="rId2"/>
+          <a:stretch>
+            <a:fillRect/>
+          </a:stretch>
+        </p:blipFill>
+        <p:spPr>
+          <a:xfrm>
+            <a:off x="5205248" y="2390474"/>
+            <a:ext cx="6172200" cy="469900"/>
+          </a:xfrm>
+          <a:prstGeom prst="rect">
+            <a:avLst/>
+          </a:prstGeom>
+        </p:spPr>
+      </p:pic>
+      <p:pic>
+        <p:nvPicPr>
+          <p:cNvPr id="17" name="Picture 16">
+            <a:extLst>
+              <a:ext uri="{FF2B5EF4-FFF2-40B4-BE49-F238E27FC236}">
+                <a16:creationId xmlns:a16="http://schemas.microsoft.com/office/drawing/2014/main" id="{3A28FAC8-F265-4548-9B93-7D30A6375545}"/>
+              </a:ext>
+            </a:extLst>
+          </p:cNvPr>
+          <p:cNvPicPr>
+            <a:picLocks noChangeAspect="1"/>
+          </p:cNvPicPr>
+          <p:nvPr/>
+        </p:nvPicPr>
+        <p:blipFill>
+          <a:blip r:embed="rId3"/>
+          <a:stretch>
+            <a:fillRect/>
+          </a:stretch>
+        </p:blipFill>
+        <p:spPr>
+          <a:xfrm>
+            <a:off x="1130081" y="1690688"/>
+            <a:ext cx="5118100" cy="4800600"/>
+          </a:xfrm>
+          <a:prstGeom prst="rect">
+            <a:avLst/>
+          </a:prstGeom>
+        </p:spPr>
+      </p:pic>
+    </p:spTree>
+    <p:extLst>
+      <p:ext uri="{BB962C8B-B14F-4D97-AF65-F5344CB8AC3E}">
+        <p14:creationId xmlns:p14="http://schemas.microsoft.com/office/powerpoint/2010/main" val="4286585104"/>
+      </p:ext>
+    </p:extLst>
+  </p:cSld>
+  <p:clrMapOvr>
+    <a:masterClrMapping/>
+  </p:clrMapOvr>
+</p:sld>
+</file>
+
 <file path=ppt/theme/theme1.xml><?xml version="1.0" encoding="utf-8"?>
 <a:theme xmlns:a="http://schemas.openxmlformats.org/drawingml/2006/main" name="Office Theme">
   <a:themeElements>

</xml_diff>